<commit_message>
Initialize PoC cleanup and figure saves.
</commit_message>
<xml_diff>
--- a/zDesignDrafts/Sketch for stepwise tour.pptx
+++ b/zDesignDrafts/Sketch for stepwise tour.pptx
@@ -6,13 +6,17 @@
   </p:sldMasterIdLst>
   <p:sldIdLst>
     <p:sldId id="257" r:id="rId2"/>
-    <p:sldId id="266" r:id="rId3"/>
-    <p:sldId id="268" r:id="rId4"/>
-    <p:sldId id="262" r:id="rId5"/>
-    <p:sldId id="269" r:id="rId6"/>
-    <p:sldId id="261" r:id="rId7"/>
-    <p:sldId id="263" r:id="rId8"/>
-    <p:sldId id="264" r:id="rId9"/>
+    <p:sldId id="270" r:id="rId3"/>
+    <p:sldId id="266" r:id="rId4"/>
+    <p:sldId id="271" r:id="rId5"/>
+    <p:sldId id="273" r:id="rId6"/>
+    <p:sldId id="272" r:id="rId7"/>
+    <p:sldId id="268" r:id="rId8"/>
+    <p:sldId id="262" r:id="rId9"/>
+    <p:sldId id="269" r:id="rId10"/>
+    <p:sldId id="261" r:id="rId11"/>
+    <p:sldId id="263" r:id="rId12"/>
+    <p:sldId id="264" r:id="rId13"/>
   </p:sldIdLst>
   <p:sldSz cx="12192000" cy="6858000"/>
   <p:notesSz cx="7010400" cy="9296400"/>
@@ -266,7 +270,7 @@
           <a:p>
             <a:fld id="{DF9E133C-D775-44AC-B629-43372F2DE94E}" type="datetimeFigureOut">
               <a:rPr lang="en-US" smtClean="0"/>
-              <a:t>01-Feb-21</a:t>
+              <a:t>16-Feb-21</a:t>
             </a:fld>
             <a:endParaRPr lang="en-US"/>
           </a:p>
@@ -464,7 +468,7 @@
           <a:p>
             <a:fld id="{DF9E133C-D775-44AC-B629-43372F2DE94E}" type="datetimeFigureOut">
               <a:rPr lang="en-US" smtClean="0"/>
-              <a:t>01-Feb-21</a:t>
+              <a:t>16-Feb-21</a:t>
             </a:fld>
             <a:endParaRPr lang="en-US"/>
           </a:p>
@@ -672,7 +676,7 @@
           <a:p>
             <a:fld id="{DF9E133C-D775-44AC-B629-43372F2DE94E}" type="datetimeFigureOut">
               <a:rPr lang="en-US" smtClean="0"/>
-              <a:t>01-Feb-21</a:t>
+              <a:t>16-Feb-21</a:t>
             </a:fld>
             <a:endParaRPr lang="en-US"/>
           </a:p>
@@ -870,7 +874,7 @@
           <a:p>
             <a:fld id="{DF9E133C-D775-44AC-B629-43372F2DE94E}" type="datetimeFigureOut">
               <a:rPr lang="en-US" smtClean="0"/>
-              <a:t>01-Feb-21</a:t>
+              <a:t>16-Feb-21</a:t>
             </a:fld>
             <a:endParaRPr lang="en-US"/>
           </a:p>
@@ -1145,7 +1149,7 @@
           <a:p>
             <a:fld id="{DF9E133C-D775-44AC-B629-43372F2DE94E}" type="datetimeFigureOut">
               <a:rPr lang="en-US" smtClean="0"/>
-              <a:t>01-Feb-21</a:t>
+              <a:t>16-Feb-21</a:t>
             </a:fld>
             <a:endParaRPr lang="en-US"/>
           </a:p>
@@ -1410,7 +1414,7 @@
           <a:p>
             <a:fld id="{DF9E133C-D775-44AC-B629-43372F2DE94E}" type="datetimeFigureOut">
               <a:rPr lang="en-US" smtClean="0"/>
-              <a:t>01-Feb-21</a:t>
+              <a:t>16-Feb-21</a:t>
             </a:fld>
             <a:endParaRPr lang="en-US"/>
           </a:p>
@@ -1822,7 +1826,7 @@
           <a:p>
             <a:fld id="{DF9E133C-D775-44AC-B629-43372F2DE94E}" type="datetimeFigureOut">
               <a:rPr lang="en-US" smtClean="0"/>
-              <a:t>01-Feb-21</a:t>
+              <a:t>16-Feb-21</a:t>
             </a:fld>
             <a:endParaRPr lang="en-US"/>
           </a:p>
@@ -1963,7 +1967,7 @@
           <a:p>
             <a:fld id="{DF9E133C-D775-44AC-B629-43372F2DE94E}" type="datetimeFigureOut">
               <a:rPr lang="en-US" smtClean="0"/>
-              <a:t>01-Feb-21</a:t>
+              <a:t>16-Feb-21</a:t>
             </a:fld>
             <a:endParaRPr lang="en-US"/>
           </a:p>
@@ -2076,7 +2080,7 @@
           <a:p>
             <a:fld id="{DF9E133C-D775-44AC-B629-43372F2DE94E}" type="datetimeFigureOut">
               <a:rPr lang="en-US" smtClean="0"/>
-              <a:t>01-Feb-21</a:t>
+              <a:t>16-Feb-21</a:t>
             </a:fld>
             <a:endParaRPr lang="en-US"/>
           </a:p>
@@ -2387,7 +2391,7 @@
           <a:p>
             <a:fld id="{DF9E133C-D775-44AC-B629-43372F2DE94E}" type="datetimeFigureOut">
               <a:rPr lang="en-US" smtClean="0"/>
-              <a:t>01-Feb-21</a:t>
+              <a:t>16-Feb-21</a:t>
             </a:fld>
             <a:endParaRPr lang="en-US"/>
           </a:p>
@@ -2675,7 +2679,7 @@
           <a:p>
             <a:fld id="{DF9E133C-D775-44AC-B629-43372F2DE94E}" type="datetimeFigureOut">
               <a:rPr lang="en-US" smtClean="0"/>
-              <a:t>01-Feb-21</a:t>
+              <a:t>16-Feb-21</a:t>
             </a:fld>
             <a:endParaRPr lang="en-US"/>
           </a:p>
@@ -2916,7 +2920,7 @@
           <a:p>
             <a:fld id="{DF9E133C-D775-44AC-B629-43372F2DE94E}" type="datetimeFigureOut">
               <a:rPr lang="en-US" smtClean="0"/>
-              <a:t>01-Feb-21</a:t>
+              <a:t>16-Feb-21</a:t>
             </a:fld>
             <a:endParaRPr lang="en-US"/>
           </a:p>
@@ -3638,6 +3642,647 @@
 </p:sld>
 </file>
 
+<file path=ppt/slides/slide10.xml><?xml version="1.0" encoding="utf-8"?>
+<p:sld xmlns:a="http://schemas.openxmlformats.org/drawingml/2006/main" xmlns:r="http://schemas.openxmlformats.org/officeDocument/2006/relationships" xmlns:p="http://schemas.openxmlformats.org/presentationml/2006/main">
+  <p:cSld>
+    <p:spTree>
+      <p:nvGrpSpPr>
+        <p:cNvPr id="1" name=""/>
+        <p:cNvGrpSpPr/>
+        <p:nvPr/>
+      </p:nvGrpSpPr>
+      <p:grpSpPr>
+        <a:xfrm>
+          <a:off x="0" y="0"/>
+          <a:ext cx="0" cy="0"/>
+          <a:chOff x="0" y="0"/>
+          <a:chExt cx="0" cy="0"/>
+        </a:xfrm>
+      </p:grpSpPr>
+      <p:sp>
+        <p:nvSpPr>
+          <p:cNvPr id="2" name="Title 1">
+            <a:extLst>
+              <a:ext uri="{FF2B5EF4-FFF2-40B4-BE49-F238E27FC236}">
+                <a16:creationId xmlns:a16="http://schemas.microsoft.com/office/drawing/2014/main" id="{EB6F2D7F-7080-415A-BA17-D9F66D57063E}"/>
+              </a:ext>
+            </a:extLst>
+          </p:cNvPr>
+          <p:cNvSpPr>
+            <a:spLocks noGrp="1"/>
+          </p:cNvSpPr>
+          <p:nvPr>
+            <p:ph type="title"/>
+          </p:nvPr>
+        </p:nvSpPr>
+        <p:spPr/>
+        <p:txBody>
+          <a:bodyPr/>
+          <a:lstStyle/>
+          <a:p>
+            <a:r>
+              <a:rPr lang="en-US" dirty="0"/>
+              <a:t>Shiny app to facilitate EDA and proper PC embedding before ML?</a:t>
+            </a:r>
+          </a:p>
+        </p:txBody>
+      </p:sp>
+      <p:sp>
+        <p:nvSpPr>
+          <p:cNvPr id="3" name="Content Placeholder 2">
+            <a:extLst>
+              <a:ext uri="{FF2B5EF4-FFF2-40B4-BE49-F238E27FC236}">
+                <a16:creationId xmlns:a16="http://schemas.microsoft.com/office/drawing/2014/main" id="{90CC40C4-5EF3-4D5D-B8A8-29DB20A1BC72}"/>
+              </a:ext>
+            </a:extLst>
+          </p:cNvPr>
+          <p:cNvSpPr>
+            <a:spLocks noGrp="1"/>
+          </p:cNvSpPr>
+          <p:nvPr>
+            <p:ph idx="1"/>
+          </p:nvPr>
+        </p:nvSpPr>
+        <p:spPr/>
+        <p:txBody>
+          <a:bodyPr numCol="2"/>
+          <a:lstStyle/>
+          <a:p>
+            <a:pPr marL="0" indent="0">
+              <a:buNone/>
+            </a:pPr>
+            <a:r>
+              <a:rPr lang="en-US" dirty="0"/>
+              <a:t>Pros</a:t>
+            </a:r>
+          </a:p>
+          <a:p>
+            <a:pPr>
+              <a:buFontTx/>
+              <a:buChar char="-"/>
+            </a:pPr>
+            <a:r>
+              <a:rPr lang="en-US" dirty="0"/>
+              <a:t>Save run &amp; iteration time</a:t>
+            </a:r>
+          </a:p>
+          <a:p>
+            <a:pPr>
+              <a:buFontTx/>
+              <a:buChar char="-"/>
+            </a:pPr>
+            <a:r>
+              <a:rPr lang="en-US" dirty="0"/>
+              <a:t>Improved EDA</a:t>
+            </a:r>
+          </a:p>
+          <a:p>
+            <a:pPr marL="0" indent="0">
+              <a:buNone/>
+            </a:pPr>
+            <a:r>
+              <a:rPr lang="en-US" dirty="0"/>
+              <a:t>- Suggest smarter hyperparameters or altogether bypass some</a:t>
+            </a:r>
+          </a:p>
+          <a:p>
+            <a:pPr marL="0" indent="0">
+              <a:buNone/>
+            </a:pPr>
+            <a:r>
+              <a:rPr lang="en-US" dirty="0"/>
+              <a:t>- Free &amp;Opensource</a:t>
+            </a:r>
+          </a:p>
+          <a:p>
+            <a:pPr marL="0" indent="0">
+              <a:buNone/>
+            </a:pPr>
+            <a:endParaRPr lang="en-US" dirty="0"/>
+          </a:p>
+          <a:p>
+            <a:pPr marL="0" indent="0">
+              <a:buNone/>
+            </a:pPr>
+            <a:endParaRPr lang="en-US" dirty="0"/>
+          </a:p>
+          <a:p>
+            <a:pPr marL="0" indent="0">
+              <a:buNone/>
+            </a:pPr>
+            <a:r>
+              <a:rPr lang="en-US" dirty="0"/>
+              <a:t>Cons</a:t>
+            </a:r>
+          </a:p>
+          <a:p>
+            <a:pPr>
+              <a:buFontTx/>
+              <a:buChar char="-"/>
+            </a:pPr>
+            <a:r>
+              <a:rPr lang="en-US" dirty="0"/>
+              <a:t>Limited flexibility for end user;</a:t>
+            </a:r>
+          </a:p>
+          <a:p>
+            <a:pPr marL="0" indent="0">
+              <a:buNone/>
+            </a:pPr>
+            <a:r>
+              <a:rPr lang="en-US" dirty="0"/>
+              <a:t>can’t handle unexpected cases</a:t>
+            </a:r>
+          </a:p>
+          <a:p>
+            <a:pPr>
+              <a:buFontTx/>
+              <a:buChar char="-"/>
+            </a:pPr>
+            <a:r>
+              <a:rPr lang="en-US" dirty="0"/>
+              <a:t>PC output more abstract than orthogonal variable, but going into black box model anyway. Consider </a:t>
+            </a:r>
+            <a:r>
+              <a:rPr lang="en-US" dirty="0" err="1"/>
+              <a:t>varible</a:t>
+            </a:r>
+            <a:r>
+              <a:rPr lang="en-US" dirty="0"/>
+              <a:t> output as well.</a:t>
+            </a:r>
+          </a:p>
+          <a:p>
+            <a:pPr>
+              <a:buFontTx/>
+              <a:buChar char="-"/>
+            </a:pPr>
+            <a:endParaRPr lang="en-US" dirty="0"/>
+          </a:p>
+        </p:txBody>
+      </p:sp>
+    </p:spTree>
+    <p:extLst>
+      <p:ext uri="{BB962C8B-B14F-4D97-AF65-F5344CB8AC3E}">
+        <p14:creationId xmlns:p14="http://schemas.microsoft.com/office/powerpoint/2010/main" val="1138983078"/>
+      </p:ext>
+    </p:extLst>
+  </p:cSld>
+  <p:clrMapOvr>
+    <a:masterClrMapping/>
+  </p:clrMapOvr>
+</p:sld>
+</file>
+
+<file path=ppt/slides/slide11.xml><?xml version="1.0" encoding="utf-8"?>
+<p:sld xmlns:a="http://schemas.openxmlformats.org/drawingml/2006/main" xmlns:r="http://schemas.openxmlformats.org/officeDocument/2006/relationships" xmlns:p="http://schemas.openxmlformats.org/presentationml/2006/main">
+  <p:cSld>
+    <p:spTree>
+      <p:nvGrpSpPr>
+        <p:cNvPr id="1" name=""/>
+        <p:cNvGrpSpPr/>
+        <p:nvPr/>
+      </p:nvGrpSpPr>
+      <p:grpSpPr>
+        <a:xfrm>
+          <a:off x="0" y="0"/>
+          <a:ext cx="0" cy="0"/>
+          <a:chOff x="0" y="0"/>
+          <a:chExt cx="0" cy="0"/>
+        </a:xfrm>
+      </p:grpSpPr>
+      <p:sp>
+        <p:nvSpPr>
+          <p:cNvPr id="2" name="Title 1">
+            <a:extLst>
+              <a:ext uri="{FF2B5EF4-FFF2-40B4-BE49-F238E27FC236}">
+                <a16:creationId xmlns:a16="http://schemas.microsoft.com/office/drawing/2014/main" id="{7CF60418-073B-4C10-948F-E1E952AF1277}"/>
+              </a:ext>
+            </a:extLst>
+          </p:cNvPr>
+          <p:cNvSpPr>
+            <a:spLocks noGrp="1"/>
+          </p:cNvSpPr>
+          <p:nvPr>
+            <p:ph type="title"/>
+          </p:nvPr>
+        </p:nvSpPr>
+        <p:spPr/>
+        <p:txBody>
+          <a:bodyPr/>
+          <a:lstStyle/>
+          <a:p>
+            <a:r>
+              <a:rPr lang="en-US" dirty="0"/>
+              <a:t>Notes</a:t>
+            </a:r>
+          </a:p>
+        </p:txBody>
+      </p:sp>
+      <p:sp>
+        <p:nvSpPr>
+          <p:cNvPr id="3" name="Content Placeholder 2">
+            <a:extLst>
+              <a:ext uri="{FF2B5EF4-FFF2-40B4-BE49-F238E27FC236}">
+                <a16:creationId xmlns:a16="http://schemas.microsoft.com/office/drawing/2014/main" id="{66F3D042-BAA9-4B58-82A6-92A673869CA8}"/>
+              </a:ext>
+            </a:extLst>
+          </p:cNvPr>
+          <p:cNvSpPr>
+            <a:spLocks noGrp="1"/>
+          </p:cNvSpPr>
+          <p:nvPr>
+            <p:ph idx="1"/>
+          </p:nvPr>
+        </p:nvSpPr>
+        <p:spPr/>
+        <p:txBody>
+          <a:bodyPr>
+            <a:normAutofit/>
+          </a:bodyPr>
+          <a:lstStyle/>
+          <a:p>
+            <a:r>
+              <a:rPr lang="en-US" dirty="0"/>
+              <a:t>Remember half baked spinifex apps including gallery, DT table.</a:t>
+            </a:r>
+          </a:p>
+          <a:p>
+            <a:r>
+              <a:rPr lang="en-US" dirty="0"/>
+              <a:t>Good use of: </a:t>
+            </a:r>
+            <a:r>
+              <a:rPr lang="en-US" dirty="0" err="1"/>
+              <a:t>Shinythemes</a:t>
+            </a:r>
+            <a:r>
+              <a:rPr lang="en-US" dirty="0"/>
+              <a:t>, </a:t>
+            </a:r>
+            <a:r>
+              <a:rPr lang="en-US" dirty="0" err="1"/>
+              <a:t>shinyJS</a:t>
+            </a:r>
+            <a:r>
+              <a:rPr lang="en-US" dirty="0"/>
+              <a:t>, notifications.</a:t>
+            </a:r>
+          </a:p>
+          <a:p>
+            <a:r>
+              <a:rPr lang="en-US" dirty="0"/>
+              <a:t>Plots as </a:t>
+            </a:r>
+            <a:r>
+              <a:rPr lang="en-US" dirty="0" err="1"/>
+              <a:t>plotly</a:t>
+            </a:r>
+            <a:r>
+              <a:rPr lang="en-US" dirty="0"/>
+              <a:t> </a:t>
+            </a:r>
+            <a:r>
+              <a:rPr lang="en-US" dirty="0" err="1"/>
+              <a:t>objs</a:t>
+            </a:r>
+            <a:r>
+              <a:rPr lang="en-US" dirty="0"/>
+              <a:t>? Look into Carson S’s UseR2018 workshop.</a:t>
+            </a:r>
+          </a:p>
+          <a:p>
+            <a:r>
+              <a:rPr lang="en-US" dirty="0"/>
+              <a:t>Make sure to review Liminal (errors from main 2 tour options, last push Oct 2020?)</a:t>
+            </a:r>
+          </a:p>
+          <a:p>
+            <a:endParaRPr lang="en-US" dirty="0"/>
+          </a:p>
+          <a:p>
+            <a:pPr marL="0" indent="0">
+              <a:buNone/>
+            </a:pPr>
+            <a:endParaRPr lang="en-US" dirty="0"/>
+          </a:p>
+        </p:txBody>
+      </p:sp>
+    </p:spTree>
+    <p:extLst>
+      <p:ext uri="{BB962C8B-B14F-4D97-AF65-F5344CB8AC3E}">
+        <p14:creationId xmlns:p14="http://schemas.microsoft.com/office/powerpoint/2010/main" val="4215079279"/>
+      </p:ext>
+    </p:extLst>
+  </p:cSld>
+  <p:clrMapOvr>
+    <a:masterClrMapping/>
+  </p:clrMapOvr>
+</p:sld>
+</file>
+
+<file path=ppt/slides/slide12.xml><?xml version="1.0" encoding="utf-8"?>
+<p:sld xmlns:a="http://schemas.openxmlformats.org/drawingml/2006/main" xmlns:r="http://schemas.openxmlformats.org/officeDocument/2006/relationships" xmlns:p="http://schemas.openxmlformats.org/presentationml/2006/main">
+  <p:cSld>
+    <p:spTree>
+      <p:nvGrpSpPr>
+        <p:cNvPr id="1" name=""/>
+        <p:cNvGrpSpPr/>
+        <p:nvPr/>
+      </p:nvGrpSpPr>
+      <p:grpSpPr>
+        <a:xfrm>
+          <a:off x="0" y="0"/>
+          <a:ext cx="0" cy="0"/>
+          <a:chOff x="0" y="0"/>
+          <a:chExt cx="0" cy="0"/>
+        </a:xfrm>
+      </p:grpSpPr>
+      <p:sp>
+        <p:nvSpPr>
+          <p:cNvPr id="2" name="Title 1">
+            <a:extLst>
+              <a:ext uri="{FF2B5EF4-FFF2-40B4-BE49-F238E27FC236}">
+                <a16:creationId xmlns:a16="http://schemas.microsoft.com/office/drawing/2014/main" id="{86F9D6D2-E472-406B-AB54-6DF1D760D98C}"/>
+              </a:ext>
+            </a:extLst>
+          </p:cNvPr>
+          <p:cNvSpPr>
+            <a:spLocks noGrp="1"/>
+          </p:cNvSpPr>
+          <p:nvPr>
+            <p:ph type="title"/>
+          </p:nvPr>
+        </p:nvSpPr>
+        <p:spPr/>
+        <p:txBody>
+          <a:bodyPr/>
+          <a:lstStyle/>
+          <a:p>
+            <a:r>
+              <a:rPr lang="en-US" dirty="0"/>
+              <a:t>tSNE and multivariate viz </a:t>
+            </a:r>
+            <a:r>
+              <a:rPr lang="en-US" dirty="0" err="1"/>
+              <a:t>implementaions</a:t>
+            </a:r>
+            <a:endParaRPr lang="en-US" dirty="0"/>
+          </a:p>
+        </p:txBody>
+      </p:sp>
+      <p:sp>
+        <p:nvSpPr>
+          <p:cNvPr id="3" name="Content Placeholder 2">
+            <a:extLst>
+              <a:ext uri="{FF2B5EF4-FFF2-40B4-BE49-F238E27FC236}">
+                <a16:creationId xmlns:a16="http://schemas.microsoft.com/office/drawing/2014/main" id="{0A84A87C-FF78-4A4A-875D-7EB1B1B30DE2}"/>
+              </a:ext>
+            </a:extLst>
+          </p:cNvPr>
+          <p:cNvSpPr>
+            <a:spLocks noGrp="1"/>
+          </p:cNvSpPr>
+          <p:nvPr>
+            <p:ph idx="1"/>
+          </p:nvPr>
+        </p:nvSpPr>
+        <p:spPr/>
+        <p:txBody>
+          <a:bodyPr>
+            <a:normAutofit fontScale="32500" lnSpcReduction="20000"/>
+          </a:bodyPr>
+          <a:lstStyle/>
+          <a:p>
+            <a:r>
+              <a:rPr lang="en-US" dirty="0"/>
+              <a:t>Blog, parameterization: </a:t>
+            </a:r>
+            <a:r>
+              <a:rPr lang="en-US" dirty="0">
+                <a:hlinkClick r:id="rId2"/>
+              </a:rPr>
+              <a:t>https://jef.works/blog/2018/04/10/interactive-tsne/</a:t>
+            </a:r>
+            <a:endParaRPr lang="en-US" dirty="0"/>
+          </a:p>
+          <a:p>
+            <a:r>
+              <a:rPr lang="en-US" dirty="0"/>
+              <a:t>Blog, vignette: https://www.kaggle.com/maniyar2jaimin/interactive-plotly-guide-to-pca-lda-t-sne</a:t>
+            </a:r>
+          </a:p>
+          <a:p>
+            <a:r>
+              <a:rPr lang="en-US" dirty="0">
+                <a:hlinkClick r:id="rId3"/>
+              </a:rPr>
+              <a:t>https://cs.stanford.edu/people/karpathy/tsnejs/csvdemo.html</a:t>
+            </a:r>
+            <a:r>
+              <a:rPr lang="en-US" dirty="0"/>
+              <a:t> </a:t>
+            </a:r>
+          </a:p>
+          <a:p>
+            <a:pPr lvl="1"/>
+            <a:r>
+              <a:rPr lang="en-US" dirty="0"/>
+              <a:t>tweets</a:t>
+            </a:r>
+          </a:p>
+          <a:p>
+            <a:r>
+              <a:rPr lang="en-US" dirty="0">
+                <a:hlinkClick r:id="rId4"/>
+              </a:rPr>
+              <a:t>https://distill.pub/2016/misread-tsne/</a:t>
+            </a:r>
+            <a:r>
+              <a:rPr lang="en-US" dirty="0"/>
+              <a:t>]</a:t>
+            </a:r>
+          </a:p>
+          <a:p>
+            <a:r>
+              <a:rPr lang="en-US" dirty="0">
+                <a:hlinkClick r:id="rId5"/>
+              </a:rPr>
+              <a:t>https://sirselim.github.io/tSNE_plotting/</a:t>
+            </a:r>
+            <a:endParaRPr lang="en-US" dirty="0"/>
+          </a:p>
+          <a:p>
+            <a:pPr lvl="1"/>
+            <a:r>
+              <a:rPr lang="en-US" dirty="0"/>
+              <a:t>paper: https://github.com/sirselim/immunecell_methylation_paper_data</a:t>
+            </a:r>
+          </a:p>
+          <a:p>
+            <a:r>
+              <a:rPr lang="en-US" dirty="0">
+                <a:hlinkClick r:id="rId6"/>
+              </a:rPr>
+              <a:t>https://cs.stanford.edu/people/karpathy/tsnejs/</a:t>
+            </a:r>
+            <a:endParaRPr lang="en-US" dirty="0"/>
+          </a:p>
+          <a:p>
+            <a:endParaRPr lang="en-US" dirty="0"/>
+          </a:p>
+          <a:p>
+            <a:r>
+              <a:rPr lang="en-US" dirty="0">
+                <a:hlinkClick r:id="rId7"/>
+              </a:rPr>
+              <a:t>https://nicola17.github.io/tfjs-tsne-demo/</a:t>
+            </a:r>
+            <a:endParaRPr lang="en-US" dirty="0"/>
+          </a:p>
+          <a:p>
+            <a:pPr lvl="1"/>
+            <a:r>
+              <a:rPr lang="en-US" dirty="0"/>
+              <a:t>Blog: </a:t>
+            </a:r>
+            <a:r>
+              <a:rPr lang="en-US" dirty="0">
+                <a:hlinkClick r:id="rId7"/>
+              </a:rPr>
+              <a:t>https://ai.googleblog.com/2018/06/realtime-tsne-visualizations-with.html</a:t>
+            </a:r>
+            <a:endParaRPr lang="en-US" dirty="0"/>
+          </a:p>
+          <a:p>
+            <a:pPr lvl="1"/>
+            <a:r>
+              <a:rPr lang="en-US" dirty="0"/>
+              <a:t>Paper: </a:t>
+            </a:r>
+            <a:r>
+              <a:rPr lang="en-US" dirty="0">
+                <a:hlinkClick r:id="rId8"/>
+              </a:rPr>
+              <a:t>https://arxiv.org/abs/1805.10817</a:t>
+            </a:r>
+            <a:endParaRPr lang="en-US" dirty="0"/>
+          </a:p>
+          <a:p>
+            <a:pPr lvl="1"/>
+            <a:r>
+              <a:rPr lang="en-US" dirty="0"/>
+              <a:t>VIS 2019 pptx</a:t>
+            </a:r>
+          </a:p>
+          <a:p>
+            <a:r>
+              <a:rPr lang="en-US" dirty="0"/>
+              <a:t>Paper: </a:t>
+            </a:r>
+            <a:r>
+              <a:rPr lang="en-US" dirty="0">
+                <a:hlinkClick r:id="rId9"/>
+              </a:rPr>
+              <a:t>https://arxiv.org/pdf/2002.06910.pdf</a:t>
+            </a:r>
+            <a:endParaRPr lang="en-US" dirty="0"/>
+          </a:p>
+          <a:p>
+            <a:r>
+              <a:rPr lang="en-US" dirty="0"/>
+              <a:t>Hosting, shiny-like: </a:t>
+            </a:r>
+            <a:r>
+              <a:rPr lang="en-US" dirty="0">
+                <a:hlinkClick r:id="rId10"/>
+              </a:rPr>
+              <a:t>https://bokeh.org/</a:t>
+            </a:r>
+            <a:endParaRPr lang="en-US" dirty="0"/>
+          </a:p>
+          <a:p>
+            <a:r>
+              <a:rPr lang="en-US" dirty="0"/>
+              <a:t>Stand alone: </a:t>
+            </a:r>
+            <a:r>
+              <a:rPr lang="en-US" dirty="0">
+                <a:hlinkClick r:id="rId11"/>
+              </a:rPr>
+              <a:t>https://www.cytosplore.org/</a:t>
+            </a:r>
+            <a:endParaRPr lang="en-US" dirty="0"/>
+          </a:p>
+          <a:p>
+            <a:r>
+              <a:rPr lang="en-US" dirty="0"/>
+              <a:t>Stand alone: </a:t>
+            </a:r>
+            <a:r>
+              <a:rPr lang="en-US" dirty="0">
+                <a:hlinkClick r:id="rId12"/>
+              </a:rPr>
+              <a:t>https://glueviz.org/</a:t>
+            </a:r>
+            <a:endParaRPr lang="en-US" dirty="0"/>
+          </a:p>
+          <a:p>
+            <a:r>
+              <a:rPr lang="en-US" dirty="0"/>
+              <a:t>Stand alone: </a:t>
+            </a:r>
+            <a:r>
+              <a:rPr lang="en-US" dirty="0">
+                <a:hlinkClick r:id="rId13"/>
+              </a:rPr>
+              <a:t>http://ggobi.org/index.html</a:t>
+            </a:r>
+            <a:endParaRPr lang="en-US" dirty="0"/>
+          </a:p>
+          <a:p>
+            <a:r>
+              <a:rPr lang="en-US" dirty="0"/>
+              <a:t>ORCA (T. Lumley) </a:t>
+            </a:r>
+          </a:p>
+          <a:p>
+            <a:r>
+              <a:rPr lang="en-US" dirty="0"/>
+              <a:t>Stand alone: </a:t>
+            </a:r>
+            <a:r>
+              <a:rPr lang="en-US" dirty="0">
+                <a:hlinkClick r:id="rId14"/>
+              </a:rPr>
+              <a:t>http://www.theusrus.de/Mondrian/</a:t>
+            </a:r>
+            <a:r>
+              <a:rPr lang="en-US" dirty="0"/>
+              <a:t> </a:t>
+            </a:r>
+          </a:p>
+          <a:p>
+            <a:r>
+              <a:rPr lang="en-US" dirty="0"/>
+              <a:t>Liminal: https://github.com/sa-lee/liminal/</a:t>
+            </a:r>
+          </a:p>
+        </p:txBody>
+      </p:sp>
+    </p:spTree>
+    <p:extLst>
+      <p:ext uri="{BB962C8B-B14F-4D97-AF65-F5344CB8AC3E}">
+        <p14:creationId xmlns:p14="http://schemas.microsoft.com/office/powerpoint/2010/main" val="1573782056"/>
+      </p:ext>
+    </p:extLst>
+  </p:cSld>
+  <p:clrMapOvr>
+    <a:masterClrMapping/>
+  </p:clrMapOvr>
+</p:sld>
+</file>
+
 <file path=ppt/slides/slide2.xml><?xml version="1.0" encoding="utf-8"?>
 <p:sld xmlns:a="http://schemas.openxmlformats.org/drawingml/2006/main" xmlns:r="http://schemas.openxmlformats.org/officeDocument/2006/relationships" xmlns:p="http://schemas.openxmlformats.org/presentationml/2006/main">
   <p:cSld>
@@ -3655,172 +4300,59 @@
           <a:chExt cx="0" cy="0"/>
         </a:xfrm>
       </p:grpSpPr>
-      <p:sp>
-        <p:nvSpPr>
-          <p:cNvPr id="3" name="Content Placeholder 2">
-            <a:extLst>
-              <a:ext uri="{FF2B5EF4-FFF2-40B4-BE49-F238E27FC236}">
-                <a16:creationId xmlns:a16="http://schemas.microsoft.com/office/drawing/2014/main" id="{21FD5AB4-7B1F-4BDC-A283-DB9862B7FDC8}"/>
-              </a:ext>
-            </a:extLst>
-          </p:cNvPr>
-          <p:cNvSpPr>
-            <a:spLocks noGrp="1"/>
-          </p:cNvSpPr>
-          <p:nvPr>
-            <p:ph idx="1"/>
-          </p:nvPr>
-        </p:nvSpPr>
-        <p:spPr>
-          <a:xfrm>
-            <a:off x="6924582" y="201011"/>
-            <a:ext cx="4473605" cy="6011463"/>
-          </a:xfrm>
-        </p:spPr>
-        <p:txBody>
-          <a:bodyPr>
-            <a:normAutofit/>
-          </a:bodyPr>
-          <a:lstStyle/>
-          <a:p>
-            <a:r>
-              <a:rPr lang="en-AU" sz="2000" dirty="0"/>
-              <a:t>pyramid exists only after working ML model; what about before that.</a:t>
-            </a:r>
-          </a:p>
-          <a:p>
-            <a:r>
-              <a:rPr lang="en-AU" sz="2000" dirty="0"/>
-              <a:t>Running models takes a long time.</a:t>
-            </a:r>
-          </a:p>
-          <a:p>
-            <a:r>
-              <a:rPr lang="en-AU" sz="2000" dirty="0"/>
-              <a:t>Many models use some sort of PCA initialization, but just default to some static number of PCs. </a:t>
-            </a:r>
-            <a:r>
-              <a:rPr lang="en-AU" sz="2000" dirty="0" err="1"/>
-              <a:t>Rtsne</a:t>
-            </a:r>
-            <a:r>
-              <a:rPr lang="en-AU" sz="2000" dirty="0"/>
-              <a:t> defaults to the first 50</a:t>
-            </a:r>
-          </a:p>
-          <a:p>
-            <a:pPr lvl="1"/>
-            <a:r>
-              <a:rPr lang="en-AU" sz="1600" dirty="0"/>
-              <a:t>What is </a:t>
-            </a:r>
-            <a:r>
-              <a:rPr lang="en-AU" sz="1600" dirty="0" err="1"/>
-              <a:t>idd</a:t>
-            </a:r>
-            <a:r>
-              <a:rPr lang="en-AU" sz="1600" dirty="0"/>
-              <a:t>&lt;50? You miss out on reduced run times </a:t>
-            </a:r>
-          </a:p>
-          <a:p>
-            <a:pPr lvl="1"/>
-            <a:r>
-              <a:rPr lang="en-AU" sz="1600" dirty="0"/>
-              <a:t>What if </a:t>
-            </a:r>
-            <a:r>
-              <a:rPr lang="en-AU" sz="1600" dirty="0" err="1"/>
-              <a:t>idd</a:t>
-            </a:r>
-            <a:r>
-              <a:rPr lang="en-AU" sz="1600" dirty="0"/>
-              <a:t>&gt;50? </a:t>
-            </a:r>
-          </a:p>
-          <a:p>
-            <a:r>
-              <a:rPr lang="en-AU" sz="2000" dirty="0"/>
-              <a:t>{</a:t>
-            </a:r>
-            <a:r>
-              <a:rPr lang="en-AU" sz="2000" dirty="0" err="1"/>
-              <a:t>Rdimtools</a:t>
-            </a:r>
-            <a:r>
-              <a:rPr lang="en-AU" sz="2000" dirty="0"/>
-              <a:t>} has a suite of 17 `</a:t>
-            </a:r>
-            <a:r>
-              <a:rPr lang="en-AU" sz="2000" dirty="0" err="1"/>
-              <a:t>est</a:t>
-            </a:r>
-            <a:r>
-              <a:rPr lang="en-AU" sz="2000" dirty="0"/>
-              <a:t>_*` that predict the Intrinsic data dimensionality (</a:t>
-            </a:r>
-            <a:r>
-              <a:rPr lang="en-AU" sz="2000" dirty="0" err="1"/>
-              <a:t>idd</a:t>
-            </a:r>
-            <a:r>
-              <a:rPr lang="en-AU" sz="2000" dirty="0"/>
-              <a:t>), let’s use these to initialize the dim to start a stepwise tour.</a:t>
-            </a:r>
-          </a:p>
-          <a:p>
-            <a:r>
-              <a:rPr lang="en-AU" sz="2000" dirty="0"/>
-              <a:t>Take this value, create a stepwise tour based on variance explained, in the previously suggested dim.</a:t>
-            </a:r>
-          </a:p>
-          <a:p>
-            <a:r>
-              <a:rPr lang="en-AU" sz="2000" dirty="0"/>
-              <a:t>Start your EDA here.</a:t>
-            </a:r>
-          </a:p>
-          <a:p>
-            <a:endParaRPr lang="en-AU" sz="2000" dirty="0"/>
-          </a:p>
-        </p:txBody>
-      </p:sp>
       <p:pic>
         <p:nvPicPr>
-          <p:cNvPr id="5" name="Picture 4">
-            <a:extLst>
-              <a:ext uri="{FF2B5EF4-FFF2-40B4-BE49-F238E27FC236}">
-                <a16:creationId xmlns:a16="http://schemas.microsoft.com/office/drawing/2014/main" id="{AD3C1573-FA46-4D58-AF8D-8AF68BAF078B}"/>
+          <p:cNvPr id="1026" name="Picture 2">
+            <a:extLst>
+              <a:ext uri="{FF2B5EF4-FFF2-40B4-BE49-F238E27FC236}">
+                <a16:creationId xmlns:a16="http://schemas.microsoft.com/office/drawing/2014/main" id="{EA76E10E-C98F-4AA8-A19A-780B413021F0}"/>
               </a:ext>
             </a:extLst>
           </p:cNvPr>
           <p:cNvPicPr>
-            <a:picLocks noChangeAspect="1"/>
+            <a:picLocks noChangeAspect="1" noChangeArrowheads="1"/>
           </p:cNvPicPr>
           <p:nvPr/>
         </p:nvPicPr>
         <p:blipFill>
-          <a:blip r:embed="rId2"/>
+          <a:blip r:embed="rId2">
+            <a:extLst>
+              <a:ext uri="{28A0092B-C50C-407E-A947-70E740481C1C}">
+                <a14:useLocalDpi xmlns:a14="http://schemas.microsoft.com/office/drawing/2010/main" val="0"/>
+              </a:ext>
+            </a:extLst>
+          </a:blip>
+          <a:srcRect/>
           <a:stretch>
             <a:fillRect/>
           </a:stretch>
         </p:blipFill>
-        <p:spPr>
+        <p:spPr bwMode="auto">
           <a:xfrm>
-            <a:off x="0" y="13239"/>
-            <a:ext cx="6716558" cy="6199236"/>
+            <a:off x="257452" y="785519"/>
+            <a:ext cx="11249400" cy="4418121"/>
           </a:xfrm>
           <a:prstGeom prst="rect">
             <a:avLst/>
           </a:prstGeom>
+          <a:noFill/>
+          <a:extLst>
+            <a:ext uri="{909E8E84-426E-40DD-AFC4-6F175D3DCCD1}">
+              <a14:hiddenFill xmlns:a14="http://schemas.microsoft.com/office/drawing/2010/main">
+                <a:solidFill>
+                  <a:srgbClr val="FFFFFF"/>
+                </a:solidFill>
+              </a14:hiddenFill>
+            </a:ext>
+          </a:extLst>
         </p:spPr>
       </p:pic>
       <p:sp>
         <p:nvSpPr>
-          <p:cNvPr id="6" name="TextBox 5">
-            <a:extLst>
-              <a:ext uri="{FF2B5EF4-FFF2-40B4-BE49-F238E27FC236}">
-                <a16:creationId xmlns:a16="http://schemas.microsoft.com/office/drawing/2014/main" id="{6447B5F0-0572-4CB2-B7DB-C8142AD65746}"/>
+          <p:cNvPr id="5" name="TextBox 4">
+            <a:extLst>
+              <a:ext uri="{FF2B5EF4-FFF2-40B4-BE49-F238E27FC236}">
+                <a16:creationId xmlns:a16="http://schemas.microsoft.com/office/drawing/2014/main" id="{F3147678-8A96-4A6A-A6AA-291564670B8F}"/>
               </a:ext>
             </a:extLst>
           </p:cNvPr>
@@ -3829,8 +4361,8 @@
         </p:nvSpPr>
         <p:spPr>
           <a:xfrm>
-            <a:off x="71022" y="6268960"/>
-            <a:ext cx="5814874" cy="738664"/>
+            <a:off x="363984" y="5398948"/>
+            <a:ext cx="6853561" cy="307777"/>
           </a:xfrm>
           <a:prstGeom prst="rect">
             <a:avLst/>
@@ -3845,95 +4377,33 @@
           <a:p>
             <a:pPr algn="l"/>
             <a:r>
-              <a:rPr lang="en-US" sz="1200" b="1" i="0" dirty="0">
+              <a:rPr lang="en-US" sz="1350" b="0" i="0" dirty="0">
                 <a:solidFill>
-                  <a:srgbClr val="333333"/>
+                  <a:srgbClr val="222222"/>
                 </a:solidFill>
                 <a:effectLst/>
-                <a:latin typeface="Helvetica Neue"/>
+                <a:latin typeface="Arial" panose="020B0604020202020204" pitchFamily="34" charset="0"/>
               </a:rPr>
-              <a:t>Explanatory Model Analysis</a:t>
-            </a:r>
-          </a:p>
-          <a:p>
-            <a:pPr algn="l"/>
-            <a:r>
-              <a:rPr lang="en-US" sz="1200" b="0" i="1" dirty="0" err="1">
+              <a:t>Wickham, H., &amp; Grolemund, G. (2016). </a:t>
+            </a:r>
+            <a:r>
+              <a:rPr lang="en-US" sz="1350" b="0" i="1" dirty="0">
                 <a:solidFill>
-                  <a:srgbClr val="333333"/>
+                  <a:srgbClr val="222222"/>
                 </a:solidFill>
                 <a:effectLst/>
-                <a:latin typeface="Helvetica Neue"/>
+                <a:latin typeface="Arial" panose="020B0604020202020204" pitchFamily="34" charset="0"/>
               </a:rPr>
-              <a:t>Przemyslaw</a:t>
-            </a:r>
-            <a:r>
-              <a:rPr lang="en-US" sz="1200" b="0" i="1" dirty="0">
-                <a:solidFill>
-                  <a:srgbClr val="333333"/>
-                </a:solidFill>
-                <a:effectLst/>
-                <a:latin typeface="Helvetica Neue"/>
-              </a:rPr>
-              <a:t> </a:t>
-            </a:r>
-            <a:r>
-              <a:rPr lang="en-US" sz="1200" b="0" i="1" dirty="0" err="1">
-                <a:solidFill>
-                  <a:srgbClr val="333333"/>
-                </a:solidFill>
-                <a:effectLst/>
-                <a:latin typeface="Helvetica Neue"/>
-              </a:rPr>
-              <a:t>Biecek</a:t>
-            </a:r>
-            <a:r>
-              <a:rPr lang="en-US" sz="1200" b="0" i="1" dirty="0">
-                <a:solidFill>
-                  <a:srgbClr val="333333"/>
-                </a:solidFill>
-                <a:effectLst/>
-                <a:latin typeface="Helvetica Neue"/>
-              </a:rPr>
-              <a:t> and Tomasz </a:t>
-            </a:r>
-            <a:r>
-              <a:rPr lang="en-US" sz="1200" b="0" i="1" dirty="0" err="1">
-                <a:solidFill>
-                  <a:srgbClr val="333333"/>
-                </a:solidFill>
-                <a:effectLst/>
-                <a:latin typeface="Helvetica Neue"/>
-              </a:rPr>
-              <a:t>Burzykowski</a:t>
-            </a:r>
-            <a:r>
-              <a:rPr lang="en-US" sz="1200" b="0" i="1" dirty="0">
-                <a:solidFill>
-                  <a:srgbClr val="333333"/>
-                </a:solidFill>
-                <a:effectLst/>
-                <a:latin typeface="Helvetica Neue"/>
-              </a:rPr>
-              <a:t>, http://ema.drwhy.ai/</a:t>
-            </a:r>
-            <a:endParaRPr lang="en-US" sz="1200" b="0" i="0" dirty="0">
-              <a:solidFill>
-                <a:srgbClr val="333333"/>
-              </a:solidFill>
-              <a:effectLst/>
-              <a:latin typeface="Helvetica Neue"/>
-            </a:endParaRPr>
-          </a:p>
-          <a:p>
-            <a:endParaRPr lang="en-US" dirty="0"/>
+              <a:t>R for data science. https://r4ds.had.co.nz/</a:t>
+            </a:r>
+            <a:endParaRPr lang="en-US" sz="1350" dirty="0"/>
           </a:p>
         </p:txBody>
       </p:sp>
     </p:spTree>
     <p:extLst>
       <p:ext uri="{BB962C8B-B14F-4D97-AF65-F5344CB8AC3E}">
-        <p14:creationId xmlns:p14="http://schemas.microsoft.com/office/powerpoint/2010/main" val="1952823924"/>
+        <p14:creationId xmlns:p14="http://schemas.microsoft.com/office/powerpoint/2010/main" val="3827096511"/>
       </p:ext>
     </p:extLst>
   </p:cSld>
@@ -3962,39 +4432,10 @@
       </p:grpSpPr>
       <p:sp>
         <p:nvSpPr>
-          <p:cNvPr id="2" name="Title 1">
-            <a:extLst>
-              <a:ext uri="{FF2B5EF4-FFF2-40B4-BE49-F238E27FC236}">
-                <a16:creationId xmlns:a16="http://schemas.microsoft.com/office/drawing/2014/main" id="{F38289A5-E4D5-4C4B-A4A7-DDAE7591A4C7}"/>
-              </a:ext>
-            </a:extLst>
-          </p:cNvPr>
-          <p:cNvSpPr>
-            <a:spLocks noGrp="1"/>
-          </p:cNvSpPr>
-          <p:nvPr>
-            <p:ph type="title"/>
-          </p:nvPr>
-        </p:nvSpPr>
-        <p:spPr/>
-        <p:txBody>
-          <a:bodyPr/>
-          <a:lstStyle/>
-          <a:p>
-            <a:r>
-              <a:rPr lang="en-AU" dirty="0"/>
-              <a:t>Layout – ML EDA</a:t>
-            </a:r>
-            <a:endParaRPr lang="en-US" dirty="0"/>
-          </a:p>
-        </p:txBody>
-      </p:sp>
-      <p:sp>
-        <p:nvSpPr>
           <p:cNvPr id="3" name="Content Placeholder 2">
             <a:extLst>
               <a:ext uri="{FF2B5EF4-FFF2-40B4-BE49-F238E27FC236}">
-                <a16:creationId xmlns:a16="http://schemas.microsoft.com/office/drawing/2014/main" id="{B094FDBC-AA56-4A65-8AAA-51664F20CBA8}"/>
+                <a16:creationId xmlns:a16="http://schemas.microsoft.com/office/drawing/2014/main" id="{21FD5AB4-7B1F-4BDC-A283-DB9862B7FDC8}"/>
               </a:ext>
             </a:extLst>
           </p:cNvPr>
@@ -4007,165 +4448,235 @@
         </p:nvSpPr>
         <p:spPr>
           <a:xfrm>
-            <a:off x="838200" y="1825625"/>
-            <a:ext cx="10515600" cy="4859260"/>
+            <a:off x="6924582" y="201011"/>
+            <a:ext cx="4473605" cy="6011463"/>
           </a:xfrm>
         </p:spPr>
         <p:txBody>
           <a:bodyPr>
-            <a:normAutofit lnSpcReduction="10000"/>
+            <a:normAutofit/>
           </a:bodyPr>
           <a:lstStyle/>
           <a:p>
-            <a:pPr marL="514350" indent="-514350">
-              <a:buFont typeface="+mj-lt"/>
-              <a:buAutoNum type="arabicPeriod"/>
-            </a:pPr>
-            <a:r>
-              <a:rPr lang="en-AU" dirty="0"/>
-              <a:t>Input data, pre-processing step, summarize, select target variables</a:t>
-            </a:r>
-          </a:p>
-          <a:p>
-            <a:pPr marL="514350" indent="-514350">
-              <a:buFont typeface="+mj-lt"/>
-              <a:buAutoNum type="arabicPeriod"/>
-            </a:pPr>
-            <a:r>
-              <a:rPr lang="en-AU" dirty="0"/>
-              <a:t>Use {</a:t>
-            </a:r>
-            <a:r>
-              <a:rPr lang="en-AU" dirty="0" err="1"/>
+            <a:r>
+              <a:rPr lang="en-AU" sz="2000" dirty="0"/>
+              <a:t>pyramid exists only after working ML model; what about before that.</a:t>
+            </a:r>
+          </a:p>
+          <a:p>
+            <a:r>
+              <a:rPr lang="en-AU" sz="2000" dirty="0"/>
+              <a:t>Running models takes a long time.</a:t>
+            </a:r>
+          </a:p>
+          <a:p>
+            <a:r>
+              <a:rPr lang="en-AU" sz="2000" dirty="0"/>
+              <a:t>Many models use some sort of PCA initialization, but just default to some static number of PCs. </a:t>
+            </a:r>
+            <a:r>
+              <a:rPr lang="en-AU" sz="2000" dirty="0" err="1"/>
+              <a:t>Rtsne</a:t>
+            </a:r>
+            <a:r>
+              <a:rPr lang="en-AU" sz="2000" dirty="0"/>
+              <a:t> defaults to the first 50</a:t>
+            </a:r>
+          </a:p>
+          <a:p>
+            <a:pPr lvl="1"/>
+            <a:r>
+              <a:rPr lang="en-AU" sz="1600" dirty="0"/>
+              <a:t>What is </a:t>
+            </a:r>
+            <a:r>
+              <a:rPr lang="en-AU" sz="1600" dirty="0" err="1"/>
+              <a:t>idd</a:t>
+            </a:r>
+            <a:r>
+              <a:rPr lang="en-AU" sz="1600" dirty="0"/>
+              <a:t>&lt;50? You miss out on reduced run times </a:t>
+            </a:r>
+          </a:p>
+          <a:p>
+            <a:pPr lvl="1"/>
+            <a:r>
+              <a:rPr lang="en-AU" sz="1600" dirty="0"/>
+              <a:t>What if </a:t>
+            </a:r>
+            <a:r>
+              <a:rPr lang="en-AU" sz="1600" dirty="0" err="1"/>
+              <a:t>idd</a:t>
+            </a:r>
+            <a:r>
+              <a:rPr lang="en-AU" sz="1600" dirty="0"/>
+              <a:t>&gt;50? </a:t>
+            </a:r>
+          </a:p>
+          <a:p>
+            <a:r>
+              <a:rPr lang="en-AU" sz="2000" dirty="0"/>
+              <a:t>{</a:t>
+            </a:r>
+            <a:r>
+              <a:rPr lang="en-AU" sz="2000" dirty="0" err="1"/>
               <a:t>Rdimtools</a:t>
             </a:r>
             <a:r>
-              <a:rPr lang="en-AU" dirty="0"/>
-              <a:t>} to estimate the internal data dimensionally, </a:t>
-            </a:r>
-            <a:r>
-              <a:rPr lang="en-AU" dirty="0" err="1"/>
+              <a:rPr lang="en-AU" sz="2000" dirty="0"/>
+              <a:t>} has a suite of 17 `</a:t>
+            </a:r>
+            <a:r>
+              <a:rPr lang="en-AU" sz="2000" dirty="0" err="1"/>
+              <a:t>est</a:t>
+            </a:r>
+            <a:r>
+              <a:rPr lang="en-AU" sz="2000" dirty="0"/>
+              <a:t>_*` that predict the Intrinsic data dimensionality (</a:t>
+            </a:r>
+            <a:r>
+              <a:rPr lang="en-AU" sz="2000" dirty="0" err="1"/>
               <a:t>idd</a:t>
             </a:r>
             <a:r>
-              <a:rPr lang="en-AU" dirty="0"/>
-              <a:t>^</a:t>
-            </a:r>
-          </a:p>
-          <a:p>
-            <a:pPr marL="514350" indent="-514350">
-              <a:buFont typeface="+mj-lt"/>
-              <a:buAutoNum type="arabicPeriod"/>
-            </a:pPr>
-            <a:r>
-              <a:rPr lang="en-AU" dirty="0"/>
-              <a:t>Create a stepwise tour; initialize </a:t>
-            </a:r>
-            <a:r>
-              <a:rPr lang="en-AU" dirty="0" err="1"/>
-              <a:t>pca</a:t>
-            </a:r>
-            <a:r>
-              <a:rPr lang="en-AU" dirty="0"/>
-              <a:t>/</a:t>
-            </a:r>
-            <a:r>
-              <a:rPr lang="en-AU" dirty="0" err="1"/>
-              <a:t>olda</a:t>
-            </a:r>
-            <a:r>
-              <a:rPr lang="en-AU" dirty="0"/>
-              <a:t>-space and basis, display at p = </a:t>
-            </a:r>
-            <a:r>
-              <a:rPr lang="en-AU" dirty="0" err="1"/>
-              <a:t>idd</a:t>
-            </a:r>
-            <a:r>
-              <a:rPr lang="en-AU" dirty="0"/>
-              <a:t>^, as part of ensemble graphics[Unwin, 2018] for EDA before ML.</a:t>
-            </a:r>
-            <a:endParaRPr lang="en-US" dirty="0"/>
-          </a:p>
-          <a:p>
-            <a:pPr lvl="1"/>
-            <a:r>
-              <a:rPr lang="en-US" dirty="0"/>
-              <a:t>Step wise tour -&gt; local tour/grand tour, </a:t>
-            </a:r>
-            <a:r>
-              <a:rPr lang="en-US" dirty="0" err="1"/>
-              <a:t>tsne</a:t>
-            </a:r>
-            <a:r>
-              <a:rPr lang="en-US" dirty="0"/>
-              <a:t> or </a:t>
-            </a:r>
-            <a:r>
-              <a:rPr lang="en-US" dirty="0" err="1"/>
-              <a:t>umap</a:t>
-            </a:r>
-            <a:r>
-              <a:rPr lang="en-US" dirty="0"/>
-              <a:t>, PC density, etc.</a:t>
-            </a:r>
-          </a:p>
-          <a:p>
-            <a:pPr lvl="1"/>
-            <a:r>
-              <a:rPr lang="en-US" dirty="0"/>
-              <a:t>Tooltip pointing back to observations in the original data space</a:t>
-            </a:r>
-          </a:p>
-          <a:p>
-            <a:pPr lvl="1"/>
-            <a:r>
-              <a:rPr lang="en-US" dirty="0"/>
-              <a:t>Options for occlusion, k2Density, alpha~1/density, etc.</a:t>
-            </a:r>
-          </a:p>
-          <a:p>
-            <a:pPr marL="514350" indent="-514350">
-              <a:buFont typeface="+mj-lt"/>
-              <a:buAutoNum type="arabicPeriod"/>
-            </a:pPr>
-            <a:r>
-              <a:rPr lang="en-US" dirty="0"/>
-              <a:t>Export</a:t>
-            </a:r>
-          </a:p>
-          <a:p>
-            <a:pPr lvl="1"/>
-            <a:r>
-              <a:rPr lang="en-US" dirty="0"/>
-              <a:t>Embedded PC-space</a:t>
-            </a:r>
-          </a:p>
-          <a:p>
-            <a:pPr lvl="1"/>
-            <a:r>
-              <a:rPr lang="en-US" dirty="0"/>
-              <a:t>Preprocessed data</a:t>
-            </a:r>
-          </a:p>
-          <a:p>
-            <a:pPr lvl="1"/>
-            <a:r>
-              <a:rPr lang="en-AU" dirty="0"/>
-              <a:t>ensemble graphics</a:t>
-            </a:r>
-            <a:endParaRPr lang="en-US" dirty="0"/>
-          </a:p>
-          <a:p>
-            <a:pPr lvl="1"/>
-            <a:endParaRPr lang="en-AU" dirty="0"/>
+              <a:rPr lang="en-AU" sz="2000" dirty="0"/>
+              <a:t>), let’s use these to initialize the dim to start a stepwise tour.</a:t>
+            </a:r>
+          </a:p>
+          <a:p>
+            <a:r>
+              <a:rPr lang="en-AU" sz="2000" dirty="0"/>
+              <a:t>Take this value, create a stepwise tour based on variance explained, in the previously suggested dim.</a:t>
+            </a:r>
+          </a:p>
+          <a:p>
+            <a:r>
+              <a:rPr lang="en-AU" sz="2000" dirty="0"/>
+              <a:t>Start your EDA here.</a:t>
+            </a:r>
+          </a:p>
+          <a:p>
+            <a:endParaRPr lang="en-AU" sz="2000" dirty="0"/>
+          </a:p>
+        </p:txBody>
+      </p:sp>
+      <p:pic>
+        <p:nvPicPr>
+          <p:cNvPr id="5" name="Picture 4">
+            <a:extLst>
+              <a:ext uri="{FF2B5EF4-FFF2-40B4-BE49-F238E27FC236}">
+                <a16:creationId xmlns:a16="http://schemas.microsoft.com/office/drawing/2014/main" id="{AD3C1573-FA46-4D58-AF8D-8AF68BAF078B}"/>
+              </a:ext>
+            </a:extLst>
+          </p:cNvPr>
+          <p:cNvPicPr>
+            <a:picLocks noChangeAspect="1"/>
+          </p:cNvPicPr>
+          <p:nvPr/>
+        </p:nvPicPr>
+        <p:blipFill>
+          <a:blip r:embed="rId2"/>
+          <a:stretch>
+            <a:fillRect/>
+          </a:stretch>
+        </p:blipFill>
+        <p:spPr>
+          <a:xfrm>
+            <a:off x="0" y="13239"/>
+            <a:ext cx="6716558" cy="6199236"/>
+          </a:xfrm>
+          <a:prstGeom prst="rect">
+            <a:avLst/>
+          </a:prstGeom>
+        </p:spPr>
+      </p:pic>
+      <p:sp>
+        <p:nvSpPr>
+          <p:cNvPr id="6" name="TextBox 5">
+            <a:extLst>
+              <a:ext uri="{FF2B5EF4-FFF2-40B4-BE49-F238E27FC236}">
+                <a16:creationId xmlns:a16="http://schemas.microsoft.com/office/drawing/2014/main" id="{6447B5F0-0572-4CB2-B7DB-C8142AD65746}"/>
+              </a:ext>
+            </a:extLst>
+          </p:cNvPr>
+          <p:cNvSpPr txBox="1"/>
+          <p:nvPr/>
+        </p:nvSpPr>
+        <p:spPr>
+          <a:xfrm>
+            <a:off x="71021" y="6212474"/>
+            <a:ext cx="6853561" cy="300082"/>
+          </a:xfrm>
+          <a:prstGeom prst="rect">
+            <a:avLst/>
+          </a:prstGeom>
+          <a:noFill/>
+        </p:spPr>
+        <p:txBody>
+          <a:bodyPr wrap="square" rtlCol="0">
+            <a:spAutoFit/>
+          </a:bodyPr>
+          <a:lstStyle/>
+          <a:p>
+            <a:pPr algn="l"/>
+            <a:r>
+              <a:rPr lang="en-US" sz="1350" b="0" dirty="0">
+                <a:solidFill>
+                  <a:srgbClr val="333333"/>
+                </a:solidFill>
+                <a:effectLst/>
+                <a:latin typeface="Arial" panose="020B0604020202020204" pitchFamily="34" charset="0"/>
+                <a:cs typeface="Arial" panose="020B0604020202020204" pitchFamily="34" charset="0"/>
+              </a:rPr>
+              <a:t>Biecek P. &amp; Burzykowski T. (2020). </a:t>
+            </a:r>
+            <a:r>
+              <a:rPr lang="en-US" sz="1350" i="1" dirty="0">
+                <a:solidFill>
+                  <a:srgbClr val="333333"/>
+                </a:solidFill>
+                <a:effectLst/>
+                <a:latin typeface="Arial" panose="020B0604020202020204" pitchFamily="34" charset="0"/>
+                <a:cs typeface="Arial" panose="020B0604020202020204" pitchFamily="34" charset="0"/>
+              </a:rPr>
+              <a:t>Explanatory Model Analysis</a:t>
+            </a:r>
+            <a:r>
+              <a:rPr lang="en-US" sz="1350" i="1" dirty="0">
+                <a:solidFill>
+                  <a:srgbClr val="333333"/>
+                </a:solidFill>
+                <a:latin typeface="Arial" panose="020B0604020202020204" pitchFamily="34" charset="0"/>
+                <a:cs typeface="Arial" panose="020B0604020202020204" pitchFamily="34" charset="0"/>
+              </a:rPr>
+              <a:t>.</a:t>
+            </a:r>
+            <a:r>
+              <a:rPr lang="en-US" sz="1350" b="0" i="1" dirty="0">
+                <a:solidFill>
+                  <a:srgbClr val="333333"/>
+                </a:solidFill>
+                <a:effectLst/>
+                <a:latin typeface="Arial" panose="020B0604020202020204" pitchFamily="34" charset="0"/>
+                <a:cs typeface="Arial" panose="020B0604020202020204" pitchFamily="34" charset="0"/>
+              </a:rPr>
+              <a:t> http://ema.drwhy.ai/</a:t>
+            </a:r>
+            <a:endParaRPr lang="en-US" sz="1350" b="0" i="0" dirty="0">
+              <a:solidFill>
+                <a:srgbClr val="333333"/>
+              </a:solidFill>
+              <a:effectLst/>
+              <a:latin typeface="Arial" panose="020B0604020202020204" pitchFamily="34" charset="0"/>
+              <a:cs typeface="Arial" panose="020B0604020202020204" pitchFamily="34" charset="0"/>
+            </a:endParaRPr>
           </a:p>
         </p:txBody>
       </p:sp>
     </p:spTree>
     <p:extLst>
       <p:ext uri="{BB962C8B-B14F-4D97-AF65-F5344CB8AC3E}">
-        <p14:creationId xmlns:p14="http://schemas.microsoft.com/office/powerpoint/2010/main" val="441165755"/>
+        <p14:creationId xmlns:p14="http://schemas.microsoft.com/office/powerpoint/2010/main" val="1952823924"/>
       </p:ext>
     </p:extLst>
   </p:cSld>
@@ -4192,6 +4703,1554 @@
           <a:chExt cx="0" cy="0"/>
         </a:xfrm>
       </p:grpSpPr>
+      <p:grpSp>
+        <p:nvGrpSpPr>
+          <p:cNvPr id="18" name="Group 17">
+            <a:extLst>
+              <a:ext uri="{FF2B5EF4-FFF2-40B4-BE49-F238E27FC236}">
+                <a16:creationId xmlns:a16="http://schemas.microsoft.com/office/drawing/2014/main" id="{45CD7D03-3E03-4376-A94F-1FD0DBDBE2EC}"/>
+              </a:ext>
+            </a:extLst>
+          </p:cNvPr>
+          <p:cNvGrpSpPr>
+            <a:grpSpLocks noChangeAspect="1"/>
+          </p:cNvGrpSpPr>
+          <p:nvPr/>
+        </p:nvGrpSpPr>
+        <p:grpSpPr>
+          <a:xfrm>
+            <a:off x="1012661" y="204489"/>
+            <a:ext cx="5944419" cy="2106968"/>
+            <a:chOff x="247889" y="239694"/>
+            <a:chExt cx="7430529" cy="2633710"/>
+          </a:xfrm>
+        </p:grpSpPr>
+        <p:pic>
+          <p:nvPicPr>
+            <p:cNvPr id="4" name="Picture 2">
+              <a:extLst>
+                <a:ext uri="{FF2B5EF4-FFF2-40B4-BE49-F238E27FC236}">
+                  <a16:creationId xmlns:a16="http://schemas.microsoft.com/office/drawing/2014/main" id="{6ABE4249-6DEE-48DC-A27C-76A82A9F7DAB}"/>
+                </a:ext>
+              </a:extLst>
+            </p:cNvPr>
+            <p:cNvPicPr>
+              <a:picLocks noChangeAspect="1" noChangeArrowheads="1"/>
+            </p:cNvPicPr>
+            <p:nvPr/>
+          </p:nvPicPr>
+          <p:blipFill rotWithShape="1">
+            <a:blip r:embed="rId2">
+              <a:extLst>
+                <a:ext uri="{28A0092B-C50C-407E-A947-70E740481C1C}">
+                  <a14:useLocalDpi xmlns:a14="http://schemas.microsoft.com/office/drawing/2010/main" val="0"/>
+                </a:ext>
+              </a:extLst>
+            </a:blip>
+            <a:srcRect b="9752"/>
+            <a:stretch/>
+          </p:blipFill>
+          <p:spPr bwMode="auto">
+            <a:xfrm>
+              <a:off x="247889" y="239694"/>
+              <a:ext cx="7430529" cy="2633710"/>
+            </a:xfrm>
+            <a:prstGeom prst="rect">
+              <a:avLst/>
+            </a:prstGeom>
+            <a:noFill/>
+            <a:extLst>
+              <a:ext uri="{909E8E84-426E-40DD-AFC4-6F175D3DCCD1}">
+                <a14:hiddenFill xmlns:a14="http://schemas.microsoft.com/office/drawing/2010/main">
+                  <a:solidFill>
+                    <a:srgbClr val="FFFFFF"/>
+                  </a:solidFill>
+                </a14:hiddenFill>
+              </a:ext>
+            </a:extLst>
+          </p:spPr>
+        </p:pic>
+        <p:sp>
+          <p:nvSpPr>
+            <p:cNvPr id="10" name="Rectangle: Rounded Corners 9">
+              <a:extLst>
+                <a:ext uri="{FF2B5EF4-FFF2-40B4-BE49-F238E27FC236}">
+                  <a16:creationId xmlns:a16="http://schemas.microsoft.com/office/drawing/2014/main" id="{883B7CC7-F65A-4867-A584-17C7A395454B}"/>
+                </a:ext>
+              </a:extLst>
+            </p:cNvPr>
+            <p:cNvSpPr/>
+            <p:nvPr/>
+          </p:nvSpPr>
+          <p:spPr>
+            <a:xfrm>
+              <a:off x="1418177" y="239694"/>
+              <a:ext cx="3615462" cy="1757782"/>
+            </a:xfrm>
+            <a:prstGeom prst="roundRect">
+              <a:avLst/>
+            </a:prstGeom>
+            <a:solidFill>
+              <a:srgbClr val="ACC5DC">
+                <a:alpha val="25098"/>
+              </a:srgbClr>
+            </a:solidFill>
+            <a:ln w="38100"/>
+          </p:spPr>
+          <p:style>
+            <a:lnRef idx="2">
+              <a:schemeClr val="accent1">
+                <a:shade val="50000"/>
+              </a:schemeClr>
+            </a:lnRef>
+            <a:fillRef idx="1">
+              <a:schemeClr val="accent1"/>
+            </a:fillRef>
+            <a:effectRef idx="0">
+              <a:schemeClr val="accent1"/>
+            </a:effectRef>
+            <a:fontRef idx="minor">
+              <a:schemeClr val="lt1"/>
+            </a:fontRef>
+          </p:style>
+          <p:txBody>
+            <a:bodyPr rtlCol="0" anchor="ctr"/>
+            <a:lstStyle/>
+            <a:p>
+              <a:pPr algn="ctr"/>
+              <a:endParaRPr lang="en-US"/>
+            </a:p>
+          </p:txBody>
+        </p:sp>
+        <p:sp>
+          <p:nvSpPr>
+            <p:cNvPr id="11" name="TextBox 10">
+              <a:extLst>
+                <a:ext uri="{FF2B5EF4-FFF2-40B4-BE49-F238E27FC236}">
+                  <a16:creationId xmlns:a16="http://schemas.microsoft.com/office/drawing/2014/main" id="{DEDB6138-8DA4-43CD-8C20-B6F220001B46}"/>
+                </a:ext>
+              </a:extLst>
+            </p:cNvPr>
+            <p:cNvSpPr txBox="1"/>
+            <p:nvPr/>
+          </p:nvSpPr>
+          <p:spPr>
+            <a:xfrm>
+              <a:off x="1490431" y="239694"/>
+              <a:ext cx="2805342" cy="500138"/>
+            </a:xfrm>
+            <a:prstGeom prst="rect">
+              <a:avLst/>
+            </a:prstGeom>
+            <a:noFill/>
+          </p:spPr>
+          <p:txBody>
+            <a:bodyPr wrap="square" rtlCol="0">
+              <a:spAutoFit/>
+            </a:bodyPr>
+            <a:lstStyle/>
+            <a:p>
+              <a:r>
+                <a:rPr lang="en-US" sz="2000" dirty="0">
+                  <a:solidFill>
+                    <a:schemeClr val="accent1">
+                      <a:lumMod val="75000"/>
+                    </a:schemeClr>
+                  </a:solidFill>
+                </a:rPr>
+                <a:t>ML EDA</a:t>
+              </a:r>
+            </a:p>
+          </p:txBody>
+        </p:sp>
+      </p:grpSp>
+      <p:grpSp>
+        <p:nvGrpSpPr>
+          <p:cNvPr id="19" name="Group 18">
+            <a:extLst>
+              <a:ext uri="{FF2B5EF4-FFF2-40B4-BE49-F238E27FC236}">
+                <a16:creationId xmlns:a16="http://schemas.microsoft.com/office/drawing/2014/main" id="{68EA030A-C448-4975-BF90-6D76495B02E3}"/>
+              </a:ext>
+            </a:extLst>
+          </p:cNvPr>
+          <p:cNvGrpSpPr/>
+          <p:nvPr/>
+        </p:nvGrpSpPr>
+        <p:grpSpPr>
+          <a:xfrm>
+            <a:off x="1766720" y="2139329"/>
+            <a:ext cx="4894640" cy="3975039"/>
+            <a:chOff x="1471444" y="2634448"/>
+            <a:chExt cx="4894640" cy="3975039"/>
+          </a:xfrm>
+        </p:grpSpPr>
+        <p:pic>
+          <p:nvPicPr>
+            <p:cNvPr id="5" name="Picture 4">
+              <a:extLst>
+                <a:ext uri="{FF2B5EF4-FFF2-40B4-BE49-F238E27FC236}">
+                  <a16:creationId xmlns:a16="http://schemas.microsoft.com/office/drawing/2014/main" id="{569DCE83-748C-4047-908E-EDB1D0DDF141}"/>
+                </a:ext>
+              </a:extLst>
+            </p:cNvPr>
+            <p:cNvPicPr>
+              <a:picLocks noChangeAspect="1"/>
+            </p:cNvPicPr>
+            <p:nvPr/>
+          </p:nvPicPr>
+          <p:blipFill rotWithShape="1">
+            <a:blip r:embed="rId3"/>
+            <a:srcRect b="18366"/>
+            <a:stretch/>
+          </p:blipFill>
+          <p:spPr>
+            <a:xfrm>
+              <a:off x="1471444" y="2921554"/>
+              <a:ext cx="4894640" cy="3687933"/>
+            </a:xfrm>
+            <a:prstGeom prst="rect">
+              <a:avLst/>
+            </a:prstGeom>
+          </p:spPr>
+        </p:pic>
+        <p:cxnSp>
+          <p:nvCxnSpPr>
+            <p:cNvPr id="7" name="Straight Arrow Connector 6">
+              <a:extLst>
+                <a:ext uri="{FF2B5EF4-FFF2-40B4-BE49-F238E27FC236}">
+                  <a16:creationId xmlns:a16="http://schemas.microsoft.com/office/drawing/2014/main" id="{D952CB80-9829-4196-976A-7708C5ACFDC5}"/>
+                </a:ext>
+              </a:extLst>
+            </p:cNvPr>
+            <p:cNvCxnSpPr>
+              <a:cxnSpLocks/>
+            </p:cNvCxnSpPr>
+            <p:nvPr/>
+          </p:nvCxnSpPr>
+          <p:spPr>
+            <a:xfrm>
+              <a:off x="3963154" y="2634448"/>
+              <a:ext cx="0" cy="379520"/>
+            </a:xfrm>
+            <a:prstGeom prst="straightConnector1">
+              <a:avLst/>
+            </a:prstGeom>
+            <a:ln w="38100">
+              <a:headEnd type="triangle"/>
+              <a:tailEnd type="triangle"/>
+            </a:ln>
+          </p:spPr>
+          <p:style>
+            <a:lnRef idx="1">
+              <a:schemeClr val="accent1"/>
+            </a:lnRef>
+            <a:fillRef idx="0">
+              <a:schemeClr val="accent1"/>
+            </a:fillRef>
+            <a:effectRef idx="0">
+              <a:schemeClr val="accent1"/>
+            </a:effectRef>
+            <a:fontRef idx="minor">
+              <a:schemeClr val="tx1"/>
+            </a:fontRef>
+          </p:style>
+        </p:cxnSp>
+      </p:grpSp>
+      <p:sp>
+        <p:nvSpPr>
+          <p:cNvPr id="22" name="TextBox 21">
+            <a:extLst>
+              <a:ext uri="{FF2B5EF4-FFF2-40B4-BE49-F238E27FC236}">
+                <a16:creationId xmlns:a16="http://schemas.microsoft.com/office/drawing/2014/main" id="{43CBA924-5CB5-40EB-AB4C-B75E0503B50A}"/>
+              </a:ext>
+            </a:extLst>
+          </p:cNvPr>
+          <p:cNvSpPr txBox="1"/>
+          <p:nvPr/>
+        </p:nvSpPr>
+        <p:spPr>
+          <a:xfrm>
+            <a:off x="1087613" y="6114368"/>
+            <a:ext cx="7335841" cy="507831"/>
+          </a:xfrm>
+          <a:prstGeom prst="rect">
+            <a:avLst/>
+          </a:prstGeom>
+          <a:noFill/>
+        </p:spPr>
+        <p:txBody>
+          <a:bodyPr wrap="square" rtlCol="0">
+            <a:spAutoFit/>
+          </a:bodyPr>
+          <a:lstStyle/>
+          <a:p>
+            <a:pPr algn="l"/>
+            <a:r>
+              <a:rPr lang="en-US" sz="1350" b="0" i="0" dirty="0">
+                <a:solidFill>
+                  <a:srgbClr val="222222"/>
+                </a:solidFill>
+                <a:effectLst/>
+                <a:latin typeface="Arial" panose="020B0604020202020204" pitchFamily="34" charset="0"/>
+              </a:rPr>
+              <a:t>(top) Wickham, H., &amp; Grolemund, G. (2016). </a:t>
+            </a:r>
+            <a:r>
+              <a:rPr lang="en-US" sz="1350" b="0" i="1" dirty="0">
+                <a:solidFill>
+                  <a:srgbClr val="222222"/>
+                </a:solidFill>
+                <a:effectLst/>
+                <a:latin typeface="Arial" panose="020B0604020202020204" pitchFamily="34" charset="0"/>
+              </a:rPr>
+              <a:t>R for data science. </a:t>
+            </a:r>
+            <a:r>
+              <a:rPr lang="en-US" sz="1350" b="0" i="1" dirty="0">
+                <a:solidFill>
+                  <a:srgbClr val="222222"/>
+                </a:solidFill>
+                <a:effectLst/>
+                <a:latin typeface="Arial" panose="020B0604020202020204" pitchFamily="34" charset="0"/>
+                <a:hlinkClick r:id="rId4"/>
+              </a:rPr>
+              <a:t>https://r4ds.had.co.nz/</a:t>
+            </a:r>
+            <a:endParaRPr lang="en-US" sz="1350" b="0" i="1" dirty="0">
+              <a:solidFill>
+                <a:srgbClr val="222222"/>
+              </a:solidFill>
+              <a:effectLst/>
+              <a:latin typeface="Arial" panose="020B0604020202020204" pitchFamily="34" charset="0"/>
+            </a:endParaRPr>
+          </a:p>
+          <a:p>
+            <a:r>
+              <a:rPr lang="en-US" sz="1350" b="0" dirty="0">
+                <a:solidFill>
+                  <a:srgbClr val="333333"/>
+                </a:solidFill>
+                <a:effectLst/>
+                <a:latin typeface="Arial" panose="020B0604020202020204" pitchFamily="34" charset="0"/>
+                <a:cs typeface="Arial" panose="020B0604020202020204" pitchFamily="34" charset="0"/>
+              </a:rPr>
+              <a:t>(bottom) Biecek P. &amp; Burzykowski T. (2020). </a:t>
+            </a:r>
+            <a:r>
+              <a:rPr lang="en-US" sz="1350" i="1" dirty="0">
+                <a:solidFill>
+                  <a:srgbClr val="333333"/>
+                </a:solidFill>
+                <a:effectLst/>
+                <a:latin typeface="Arial" panose="020B0604020202020204" pitchFamily="34" charset="0"/>
+                <a:cs typeface="Arial" panose="020B0604020202020204" pitchFamily="34" charset="0"/>
+              </a:rPr>
+              <a:t>Explanatory Model Analysis</a:t>
+            </a:r>
+            <a:r>
+              <a:rPr lang="en-US" sz="1350" i="1" dirty="0">
+                <a:solidFill>
+                  <a:srgbClr val="333333"/>
+                </a:solidFill>
+                <a:latin typeface="Arial" panose="020B0604020202020204" pitchFamily="34" charset="0"/>
+                <a:cs typeface="Arial" panose="020B0604020202020204" pitchFamily="34" charset="0"/>
+              </a:rPr>
+              <a:t>.</a:t>
+            </a:r>
+            <a:r>
+              <a:rPr lang="en-US" sz="1350" b="0" i="1" dirty="0">
+                <a:solidFill>
+                  <a:srgbClr val="333333"/>
+                </a:solidFill>
+                <a:effectLst/>
+                <a:latin typeface="Arial" panose="020B0604020202020204" pitchFamily="34" charset="0"/>
+                <a:cs typeface="Arial" panose="020B0604020202020204" pitchFamily="34" charset="0"/>
+              </a:rPr>
+              <a:t> </a:t>
+            </a:r>
+            <a:r>
+              <a:rPr lang="en-US" sz="1350" b="0" i="1" dirty="0">
+                <a:solidFill>
+                  <a:srgbClr val="333333"/>
+                </a:solidFill>
+                <a:effectLst/>
+                <a:latin typeface="Arial" panose="020B0604020202020204" pitchFamily="34" charset="0"/>
+                <a:cs typeface="Arial" panose="020B0604020202020204" pitchFamily="34" charset="0"/>
+                <a:hlinkClick r:id="rId5"/>
+              </a:rPr>
+              <a:t>http://ema.drwhy.ai/</a:t>
+            </a:r>
+            <a:endParaRPr lang="en-US" sz="1350" b="0" i="0" dirty="0">
+              <a:solidFill>
+                <a:srgbClr val="333333"/>
+              </a:solidFill>
+              <a:effectLst/>
+              <a:latin typeface="Arial" panose="020B0604020202020204" pitchFamily="34" charset="0"/>
+              <a:cs typeface="Arial" panose="020B0604020202020204" pitchFamily="34" charset="0"/>
+            </a:endParaRPr>
+          </a:p>
+        </p:txBody>
+      </p:sp>
+    </p:spTree>
+    <p:extLst>
+      <p:ext uri="{BB962C8B-B14F-4D97-AF65-F5344CB8AC3E}">
+        <p14:creationId xmlns:p14="http://schemas.microsoft.com/office/powerpoint/2010/main" val="1573932691"/>
+      </p:ext>
+    </p:extLst>
+  </p:cSld>
+  <p:clrMapOvr>
+    <a:masterClrMapping/>
+  </p:clrMapOvr>
+</p:sld>
+</file>
+
+<file path=ppt/slides/slide5.xml><?xml version="1.0" encoding="utf-8"?>
+<p:sld xmlns:a="http://schemas.openxmlformats.org/drawingml/2006/main" xmlns:r="http://schemas.openxmlformats.org/officeDocument/2006/relationships" xmlns:p="http://schemas.openxmlformats.org/presentationml/2006/main">
+  <p:cSld>
+    <p:spTree>
+      <p:nvGrpSpPr>
+        <p:cNvPr id="1" name=""/>
+        <p:cNvGrpSpPr/>
+        <p:nvPr/>
+      </p:nvGrpSpPr>
+      <p:grpSpPr>
+        <a:xfrm>
+          <a:off x="0" y="0"/>
+          <a:ext cx="0" cy="0"/>
+          <a:chOff x="0" y="0"/>
+          <a:chExt cx="0" cy="0"/>
+        </a:xfrm>
+      </p:grpSpPr>
+      <p:grpSp>
+        <p:nvGrpSpPr>
+          <p:cNvPr id="18" name="Group 17">
+            <a:extLst>
+              <a:ext uri="{FF2B5EF4-FFF2-40B4-BE49-F238E27FC236}">
+                <a16:creationId xmlns:a16="http://schemas.microsoft.com/office/drawing/2014/main" id="{45CD7D03-3E03-4376-A94F-1FD0DBDBE2EC}"/>
+              </a:ext>
+            </a:extLst>
+          </p:cNvPr>
+          <p:cNvGrpSpPr>
+            <a:grpSpLocks noChangeAspect="1"/>
+          </p:cNvGrpSpPr>
+          <p:nvPr/>
+        </p:nvGrpSpPr>
+        <p:grpSpPr>
+          <a:xfrm>
+            <a:off x="1012661" y="204489"/>
+            <a:ext cx="5944419" cy="2106968"/>
+            <a:chOff x="247889" y="239694"/>
+            <a:chExt cx="7430529" cy="2633710"/>
+          </a:xfrm>
+        </p:grpSpPr>
+        <p:pic>
+          <p:nvPicPr>
+            <p:cNvPr id="4" name="Picture 2">
+              <a:extLst>
+                <a:ext uri="{FF2B5EF4-FFF2-40B4-BE49-F238E27FC236}">
+                  <a16:creationId xmlns:a16="http://schemas.microsoft.com/office/drawing/2014/main" id="{6ABE4249-6DEE-48DC-A27C-76A82A9F7DAB}"/>
+                </a:ext>
+              </a:extLst>
+            </p:cNvPr>
+            <p:cNvPicPr>
+              <a:picLocks noChangeAspect="1" noChangeArrowheads="1"/>
+            </p:cNvPicPr>
+            <p:nvPr/>
+          </p:nvPicPr>
+          <p:blipFill rotWithShape="1">
+            <a:blip r:embed="rId2">
+              <a:extLst>
+                <a:ext uri="{28A0092B-C50C-407E-A947-70E740481C1C}">
+                  <a14:useLocalDpi xmlns:a14="http://schemas.microsoft.com/office/drawing/2010/main" val="0"/>
+                </a:ext>
+              </a:extLst>
+            </a:blip>
+            <a:srcRect b="9752"/>
+            <a:stretch/>
+          </p:blipFill>
+          <p:spPr bwMode="auto">
+            <a:xfrm>
+              <a:off x="247889" y="239694"/>
+              <a:ext cx="7430529" cy="2633710"/>
+            </a:xfrm>
+            <a:prstGeom prst="rect">
+              <a:avLst/>
+            </a:prstGeom>
+            <a:noFill/>
+            <a:extLst>
+              <a:ext uri="{909E8E84-426E-40DD-AFC4-6F175D3DCCD1}">
+                <a14:hiddenFill xmlns:a14="http://schemas.microsoft.com/office/drawing/2010/main">
+                  <a:solidFill>
+                    <a:srgbClr val="FFFFFF"/>
+                  </a:solidFill>
+                </a14:hiddenFill>
+              </a:ext>
+            </a:extLst>
+          </p:spPr>
+        </p:pic>
+        <p:sp>
+          <p:nvSpPr>
+            <p:cNvPr id="10" name="Rectangle: Rounded Corners 9">
+              <a:extLst>
+                <a:ext uri="{FF2B5EF4-FFF2-40B4-BE49-F238E27FC236}">
+                  <a16:creationId xmlns:a16="http://schemas.microsoft.com/office/drawing/2014/main" id="{883B7CC7-F65A-4867-A584-17C7A395454B}"/>
+                </a:ext>
+              </a:extLst>
+            </p:cNvPr>
+            <p:cNvSpPr/>
+            <p:nvPr/>
+          </p:nvSpPr>
+          <p:spPr>
+            <a:xfrm>
+              <a:off x="1418177" y="239694"/>
+              <a:ext cx="3615462" cy="1757782"/>
+            </a:xfrm>
+            <a:prstGeom prst="roundRect">
+              <a:avLst/>
+            </a:prstGeom>
+            <a:solidFill>
+              <a:srgbClr val="ACC5DC">
+                <a:alpha val="25098"/>
+              </a:srgbClr>
+            </a:solidFill>
+            <a:ln w="38100"/>
+          </p:spPr>
+          <p:style>
+            <a:lnRef idx="2">
+              <a:schemeClr val="accent1">
+                <a:shade val="50000"/>
+              </a:schemeClr>
+            </a:lnRef>
+            <a:fillRef idx="1">
+              <a:schemeClr val="accent1"/>
+            </a:fillRef>
+            <a:effectRef idx="0">
+              <a:schemeClr val="accent1"/>
+            </a:effectRef>
+            <a:fontRef idx="minor">
+              <a:schemeClr val="lt1"/>
+            </a:fontRef>
+          </p:style>
+          <p:txBody>
+            <a:bodyPr rtlCol="0" anchor="ctr"/>
+            <a:lstStyle/>
+            <a:p>
+              <a:pPr algn="ctr"/>
+              <a:endParaRPr lang="en-US"/>
+            </a:p>
+          </p:txBody>
+        </p:sp>
+        <p:sp>
+          <p:nvSpPr>
+            <p:cNvPr id="11" name="TextBox 10">
+              <a:extLst>
+                <a:ext uri="{FF2B5EF4-FFF2-40B4-BE49-F238E27FC236}">
+                  <a16:creationId xmlns:a16="http://schemas.microsoft.com/office/drawing/2014/main" id="{DEDB6138-8DA4-43CD-8C20-B6F220001B46}"/>
+                </a:ext>
+              </a:extLst>
+            </p:cNvPr>
+            <p:cNvSpPr txBox="1"/>
+            <p:nvPr/>
+          </p:nvSpPr>
+          <p:spPr>
+            <a:xfrm>
+              <a:off x="1490431" y="239694"/>
+              <a:ext cx="2805342" cy="500138"/>
+            </a:xfrm>
+            <a:prstGeom prst="rect">
+              <a:avLst/>
+            </a:prstGeom>
+            <a:noFill/>
+          </p:spPr>
+          <p:txBody>
+            <a:bodyPr wrap="square" rtlCol="0">
+              <a:spAutoFit/>
+            </a:bodyPr>
+            <a:lstStyle/>
+            <a:p>
+              <a:r>
+                <a:rPr lang="en-US" sz="2000" dirty="0">
+                  <a:solidFill>
+                    <a:schemeClr val="accent1">
+                      <a:lumMod val="75000"/>
+                    </a:schemeClr>
+                  </a:solidFill>
+                </a:rPr>
+                <a:t>ML EDA</a:t>
+              </a:r>
+            </a:p>
+          </p:txBody>
+        </p:sp>
+      </p:grpSp>
+      <p:sp>
+        <p:nvSpPr>
+          <p:cNvPr id="12" name="TextBox 11">
+            <a:extLst>
+              <a:ext uri="{FF2B5EF4-FFF2-40B4-BE49-F238E27FC236}">
+                <a16:creationId xmlns:a16="http://schemas.microsoft.com/office/drawing/2014/main" id="{BAA2CB2B-55EA-4B4B-AEC1-4A2578A78AA9}"/>
+              </a:ext>
+            </a:extLst>
+          </p:cNvPr>
+          <p:cNvSpPr txBox="1"/>
+          <p:nvPr/>
+        </p:nvSpPr>
+        <p:spPr>
+          <a:xfrm>
+            <a:off x="7625919" y="239694"/>
+            <a:ext cx="4265691" cy="6494085"/>
+          </a:xfrm>
+          <a:prstGeom prst="rect">
+            <a:avLst/>
+          </a:prstGeom>
+          <a:noFill/>
+          <a:ln w="38100">
+            <a:solidFill>
+              <a:srgbClr val="5858D4"/>
+            </a:solidFill>
+          </a:ln>
+        </p:spPr>
+        <p:txBody>
+          <a:bodyPr wrap="square" rtlCol="0">
+            <a:spAutoFit/>
+          </a:bodyPr>
+          <a:lstStyle/>
+          <a:p>
+            <a:r>
+              <a:rPr lang="en-US" sz="1600" dirty="0">
+                <a:solidFill>
+                  <a:schemeClr val="accent1">
+                    <a:lumMod val="75000"/>
+                  </a:schemeClr>
+                </a:solidFill>
+              </a:rPr>
+              <a:t>{shiny} app facilitating Machine Learning Exploratory Data Analysis </a:t>
+            </a:r>
+          </a:p>
+          <a:p>
+            <a:pPr marL="342900" indent="-342900">
+              <a:buAutoNum type="arabicParenR"/>
+            </a:pPr>
+            <a:r>
+              <a:rPr lang="en-US" sz="1600" dirty="0">
+                <a:solidFill>
+                  <a:schemeClr val="accent1">
+                    <a:lumMod val="75000"/>
+                  </a:schemeClr>
+                </a:solidFill>
+              </a:rPr>
+              <a:t>Import </a:t>
+            </a:r>
+          </a:p>
+          <a:p>
+            <a:pPr marL="800100" lvl="1" indent="-342900">
+              <a:buFont typeface="Arial" panose="020B0604020202020204" pitchFamily="34" charset="0"/>
+              <a:buChar char="•"/>
+            </a:pPr>
+            <a:r>
+              <a:rPr lang="en-US" sz="1600" dirty="0">
+                <a:solidFill>
+                  <a:schemeClr val="accent1">
+                    <a:lumMod val="75000"/>
+                  </a:schemeClr>
+                </a:solidFill>
+              </a:rPr>
+              <a:t>Import tidy data</a:t>
+            </a:r>
+          </a:p>
+          <a:p>
+            <a:pPr marL="800100" lvl="1" indent="-342900">
+              <a:buFont typeface="Arial" panose="020B0604020202020204" pitchFamily="34" charset="0"/>
+              <a:buChar char="•"/>
+            </a:pPr>
+            <a:r>
+              <a:rPr lang="en-US" sz="1600" dirty="0">
+                <a:solidFill>
+                  <a:schemeClr val="accent1">
+                    <a:lumMod val="75000"/>
+                  </a:schemeClr>
+                </a:solidFill>
+              </a:rPr>
+              <a:t>Preprocessing options</a:t>
+            </a:r>
+          </a:p>
+          <a:p>
+            <a:pPr marL="342900" indent="-342900">
+              <a:buFont typeface="+mj-lt"/>
+              <a:buAutoNum type="arabicParenR"/>
+            </a:pPr>
+            <a:r>
+              <a:rPr lang="en-US" sz="1600" dirty="0">
+                <a:solidFill>
+                  <a:schemeClr val="accent1">
+                    <a:lumMod val="75000"/>
+                  </a:schemeClr>
+                </a:solidFill>
+              </a:rPr>
+              <a:t>Explore</a:t>
+            </a:r>
+          </a:p>
+          <a:p>
+            <a:pPr marL="800100" lvl="1" indent="-342900">
+              <a:buFont typeface="Arial" panose="020B0604020202020204" pitchFamily="34" charset="0"/>
+              <a:buChar char="•"/>
+            </a:pPr>
+            <a:r>
+              <a:rPr lang="en-US" sz="1600" dirty="0">
+                <a:solidFill>
+                  <a:schemeClr val="accent1">
+                    <a:lumMod val="75000"/>
+                  </a:schemeClr>
+                </a:solidFill>
+              </a:rPr>
+              <a:t>Estimate the Intrinsic Data Dimensionality</a:t>
+            </a:r>
+          </a:p>
+          <a:p>
+            <a:pPr marL="800100" lvl="1" indent="-342900">
+              <a:buFont typeface="Arial" panose="020B0604020202020204" pitchFamily="34" charset="0"/>
+              <a:buChar char="•"/>
+            </a:pPr>
+            <a:r>
+              <a:rPr lang="en-US" sz="1600" dirty="0">
+                <a:solidFill>
+                  <a:schemeClr val="accent1">
+                    <a:lumMod val="75000"/>
+                  </a:schemeClr>
+                </a:solidFill>
+              </a:rPr>
+              <a:t>Perform PCA, consider the first IDD components in scope.</a:t>
+            </a:r>
+          </a:p>
+          <a:p>
+            <a:pPr marL="800100" lvl="1" indent="-342900">
+              <a:buFont typeface="Arial" panose="020B0604020202020204" pitchFamily="34" charset="0"/>
+              <a:buChar char="•"/>
+            </a:pPr>
+            <a:r>
+              <a:rPr lang="en-US" sz="1600" dirty="0">
+                <a:solidFill>
+                  <a:schemeClr val="accent1">
+                    <a:lumMod val="75000"/>
+                  </a:schemeClr>
+                </a:solidFill>
+              </a:rPr>
+              <a:t>Look at Ensemble Graphics: outlierness, univariate density, animated linear projections (tours), Non-linear embedding (tSNE, MDS?)</a:t>
+            </a:r>
+          </a:p>
+          <a:p>
+            <a:r>
+              <a:rPr lang="en-US" sz="1600" dirty="0">
+                <a:solidFill>
+                  <a:schemeClr val="accent1">
+                    <a:lumMod val="75000"/>
+                  </a:schemeClr>
+                </a:solidFill>
+              </a:rPr>
+              <a:t>3) Export (WIP)</a:t>
+            </a:r>
+          </a:p>
+          <a:p>
+            <a:pPr marL="285750" indent="-285750">
+              <a:buFont typeface="Arial" panose="020B0604020202020204" pitchFamily="34" charset="0"/>
+              <a:buChar char="•"/>
+            </a:pPr>
+            <a:r>
+              <a:rPr lang="en-US" sz="1600" dirty="0">
+                <a:solidFill>
+                  <a:schemeClr val="accent1">
+                    <a:lumMod val="75000"/>
+                  </a:schemeClr>
+                </a:solidFill>
+              </a:rPr>
+              <a:t>Processed data</a:t>
+            </a:r>
+          </a:p>
+          <a:p>
+            <a:pPr marL="285750" indent="-285750">
+              <a:buFont typeface="Arial" panose="020B0604020202020204" pitchFamily="34" charset="0"/>
+              <a:buChar char="•"/>
+            </a:pPr>
+            <a:r>
+              <a:rPr lang="en-US" sz="1600" dirty="0">
+                <a:solidFill>
+                  <a:schemeClr val="accent1">
+                    <a:lumMod val="75000"/>
+                  </a:schemeClr>
+                </a:solidFill>
+              </a:rPr>
+              <a:t>Graphics</a:t>
+            </a:r>
+          </a:p>
+          <a:p>
+            <a:pPr marL="285750" indent="-285750">
+              <a:buFont typeface="Arial" panose="020B0604020202020204" pitchFamily="34" charset="0"/>
+              <a:buChar char="•"/>
+            </a:pPr>
+            <a:r>
+              <a:rPr lang="en-US" sz="1600" dirty="0">
+                <a:solidFill>
+                  <a:schemeClr val="accent1">
+                    <a:lumMod val="75000"/>
+                  </a:schemeClr>
+                </a:solidFill>
+              </a:rPr>
+              <a:t>Emailed {knitr} document?</a:t>
+            </a:r>
+          </a:p>
+          <a:p>
+            <a:r>
+              <a:rPr lang="en-US" sz="1600" dirty="0">
+                <a:solidFill>
+                  <a:schemeClr val="accent1">
+                    <a:lumMod val="75000"/>
+                  </a:schemeClr>
+                </a:solidFill>
+              </a:rPr>
+              <a:t>4) About (WIP)</a:t>
+            </a:r>
+          </a:p>
+          <a:p>
+            <a:pPr marL="285750" indent="-285750">
+              <a:buFont typeface="Arial" panose="020B0604020202020204" pitchFamily="34" charset="0"/>
+              <a:buChar char="•"/>
+            </a:pPr>
+            <a:r>
+              <a:rPr lang="en-US" sz="1600" dirty="0">
+                <a:solidFill>
+                  <a:schemeClr val="accent1">
+                    <a:lumMod val="75000"/>
+                  </a:schemeClr>
+                </a:solidFill>
+              </a:rPr>
+              <a:t>Give context &amp; scope of application</a:t>
+            </a:r>
+          </a:p>
+          <a:p>
+            <a:pPr marL="285750" indent="-285750">
+              <a:buFont typeface="Arial" panose="020B0604020202020204" pitchFamily="34" charset="0"/>
+              <a:buChar char="•"/>
+            </a:pPr>
+            <a:r>
+              <a:rPr lang="en-US" sz="1600" dirty="0">
+                <a:solidFill>
+                  <a:schemeClr val="accent1">
+                    <a:lumMod val="75000"/>
+                  </a:schemeClr>
+                </a:solidFill>
+              </a:rPr>
+              <a:t>Sources and citations</a:t>
+            </a:r>
+          </a:p>
+          <a:p>
+            <a:pPr marL="285750" indent="-285750">
+              <a:buFont typeface="Arial" panose="020B0604020202020204" pitchFamily="34" charset="0"/>
+              <a:buChar char="•"/>
+            </a:pPr>
+            <a:r>
+              <a:rPr lang="en-US" sz="1600" dirty="0">
+                <a:solidFill>
+                  <a:schemeClr val="accent1">
+                    <a:lumMod val="75000"/>
+                  </a:schemeClr>
+                </a:solidFill>
+              </a:rPr>
+              <a:t>(</a:t>
+            </a:r>
+            <a:r>
+              <a:rPr lang="en-US" sz="1600" dirty="0" err="1">
+                <a:solidFill>
+                  <a:schemeClr val="accent1">
+                    <a:lumMod val="75000"/>
+                  </a:schemeClr>
+                </a:solidFill>
+              </a:rPr>
+              <a:t>i</a:t>
+            </a:r>
+            <a:r>
+              <a:rPr lang="en-US" sz="1600" dirty="0">
+                <a:solidFill>
+                  <a:schemeClr val="accent1">
+                    <a:lumMod val="75000"/>
+                  </a:schemeClr>
+                </a:solidFill>
+              </a:rPr>
+              <a:t>) info icon everywhere giving explanation &amp; defaults.</a:t>
+            </a:r>
+            <a:br>
+              <a:rPr lang="en-US" sz="1600" dirty="0">
+                <a:solidFill>
+                  <a:schemeClr val="accent1">
+                    <a:lumMod val="75000"/>
+                  </a:schemeClr>
+                </a:solidFill>
+              </a:rPr>
+            </a:br>
+            <a:endParaRPr lang="en-US" sz="1600" dirty="0">
+              <a:solidFill>
+                <a:schemeClr val="accent1">
+                  <a:lumMod val="75000"/>
+                </a:schemeClr>
+              </a:solidFill>
+            </a:endParaRPr>
+          </a:p>
+          <a:p>
+            <a:r>
+              <a:rPr lang="en-US" sz="1600" dirty="0">
+                <a:solidFill>
+                  <a:schemeClr val="accent1">
+                    <a:lumMod val="75000"/>
+                  </a:schemeClr>
+                </a:solidFill>
+              </a:rPr>
+              <a:t>Proof of Concept application:</a:t>
+            </a:r>
+          </a:p>
+          <a:p>
+            <a:endParaRPr lang="en-US" sz="1600" dirty="0">
+              <a:solidFill>
+                <a:schemeClr val="accent1">
+                  <a:lumMod val="75000"/>
+                </a:schemeClr>
+              </a:solidFill>
+            </a:endParaRPr>
+          </a:p>
+        </p:txBody>
+      </p:sp>
+      <p:cxnSp>
+        <p:nvCxnSpPr>
+          <p:cNvPr id="13" name="Straight Arrow Connector 12">
+            <a:extLst>
+              <a:ext uri="{FF2B5EF4-FFF2-40B4-BE49-F238E27FC236}">
+                <a16:creationId xmlns:a16="http://schemas.microsoft.com/office/drawing/2014/main" id="{A99D3B72-2475-4282-8576-9A5D0B1B902D}"/>
+              </a:ext>
+            </a:extLst>
+          </p:cNvPr>
+          <p:cNvCxnSpPr>
+            <a:cxnSpLocks/>
+          </p:cNvCxnSpPr>
+          <p:nvPr/>
+        </p:nvCxnSpPr>
+        <p:spPr>
+          <a:xfrm flipH="1">
+            <a:off x="4971495" y="412819"/>
+            <a:ext cx="2538242" cy="0"/>
+          </a:xfrm>
+          <a:prstGeom prst="straightConnector1">
+            <a:avLst/>
+          </a:prstGeom>
+          <a:ln w="38100">
+            <a:headEnd type="triangle"/>
+            <a:tailEnd type="triangle"/>
+          </a:ln>
+        </p:spPr>
+        <p:style>
+          <a:lnRef idx="1">
+            <a:schemeClr val="accent1"/>
+          </a:lnRef>
+          <a:fillRef idx="0">
+            <a:schemeClr val="accent1"/>
+          </a:fillRef>
+          <a:effectRef idx="0">
+            <a:schemeClr val="accent1"/>
+          </a:effectRef>
+          <a:fontRef idx="minor">
+            <a:schemeClr val="tx1"/>
+          </a:fontRef>
+        </p:style>
+      </p:cxnSp>
+      <p:grpSp>
+        <p:nvGrpSpPr>
+          <p:cNvPr id="19" name="Group 18">
+            <a:extLst>
+              <a:ext uri="{FF2B5EF4-FFF2-40B4-BE49-F238E27FC236}">
+                <a16:creationId xmlns:a16="http://schemas.microsoft.com/office/drawing/2014/main" id="{68EA030A-C448-4975-BF90-6D76495B02E3}"/>
+              </a:ext>
+            </a:extLst>
+          </p:cNvPr>
+          <p:cNvGrpSpPr/>
+          <p:nvPr/>
+        </p:nvGrpSpPr>
+        <p:grpSpPr>
+          <a:xfrm>
+            <a:off x="1766720" y="2139329"/>
+            <a:ext cx="4894640" cy="3975039"/>
+            <a:chOff x="1471444" y="2634448"/>
+            <a:chExt cx="4894640" cy="3975039"/>
+          </a:xfrm>
+        </p:grpSpPr>
+        <p:pic>
+          <p:nvPicPr>
+            <p:cNvPr id="5" name="Picture 4">
+              <a:extLst>
+                <a:ext uri="{FF2B5EF4-FFF2-40B4-BE49-F238E27FC236}">
+                  <a16:creationId xmlns:a16="http://schemas.microsoft.com/office/drawing/2014/main" id="{569DCE83-748C-4047-908E-EDB1D0DDF141}"/>
+                </a:ext>
+              </a:extLst>
+            </p:cNvPr>
+            <p:cNvPicPr>
+              <a:picLocks noChangeAspect="1"/>
+            </p:cNvPicPr>
+            <p:nvPr/>
+          </p:nvPicPr>
+          <p:blipFill rotWithShape="1">
+            <a:blip r:embed="rId3"/>
+            <a:srcRect b="18366"/>
+            <a:stretch/>
+          </p:blipFill>
+          <p:spPr>
+            <a:xfrm>
+              <a:off x="1471444" y="2921554"/>
+              <a:ext cx="4894640" cy="3687933"/>
+            </a:xfrm>
+            <a:prstGeom prst="rect">
+              <a:avLst/>
+            </a:prstGeom>
+          </p:spPr>
+        </p:pic>
+        <p:cxnSp>
+          <p:nvCxnSpPr>
+            <p:cNvPr id="7" name="Straight Arrow Connector 6">
+              <a:extLst>
+                <a:ext uri="{FF2B5EF4-FFF2-40B4-BE49-F238E27FC236}">
+                  <a16:creationId xmlns:a16="http://schemas.microsoft.com/office/drawing/2014/main" id="{D952CB80-9829-4196-976A-7708C5ACFDC5}"/>
+                </a:ext>
+              </a:extLst>
+            </p:cNvPr>
+            <p:cNvCxnSpPr>
+              <a:cxnSpLocks/>
+            </p:cNvCxnSpPr>
+            <p:nvPr/>
+          </p:nvCxnSpPr>
+          <p:spPr>
+            <a:xfrm>
+              <a:off x="3963154" y="2634448"/>
+              <a:ext cx="0" cy="379520"/>
+            </a:xfrm>
+            <a:prstGeom prst="straightConnector1">
+              <a:avLst/>
+            </a:prstGeom>
+            <a:ln w="38100">
+              <a:headEnd type="triangle"/>
+              <a:tailEnd type="triangle"/>
+            </a:ln>
+          </p:spPr>
+          <p:style>
+            <a:lnRef idx="1">
+              <a:schemeClr val="accent1"/>
+            </a:lnRef>
+            <a:fillRef idx="0">
+              <a:schemeClr val="accent1"/>
+            </a:fillRef>
+            <a:effectRef idx="0">
+              <a:schemeClr val="accent1"/>
+            </a:effectRef>
+            <a:fontRef idx="minor">
+              <a:schemeClr val="tx1"/>
+            </a:fontRef>
+          </p:style>
+        </p:cxnSp>
+      </p:grpSp>
+      <p:sp>
+        <p:nvSpPr>
+          <p:cNvPr id="22" name="TextBox 21">
+            <a:extLst>
+              <a:ext uri="{FF2B5EF4-FFF2-40B4-BE49-F238E27FC236}">
+                <a16:creationId xmlns:a16="http://schemas.microsoft.com/office/drawing/2014/main" id="{43CBA924-5CB5-40EB-AB4C-B75E0503B50A}"/>
+              </a:ext>
+            </a:extLst>
+          </p:cNvPr>
+          <p:cNvSpPr txBox="1"/>
+          <p:nvPr/>
+        </p:nvSpPr>
+        <p:spPr>
+          <a:xfrm>
+            <a:off x="290078" y="6137404"/>
+            <a:ext cx="7335841" cy="715581"/>
+          </a:xfrm>
+          <a:prstGeom prst="rect">
+            <a:avLst/>
+          </a:prstGeom>
+          <a:noFill/>
+        </p:spPr>
+        <p:txBody>
+          <a:bodyPr wrap="square" rtlCol="0">
+            <a:spAutoFit/>
+          </a:bodyPr>
+          <a:lstStyle/>
+          <a:p>
+            <a:pPr algn="l"/>
+            <a:r>
+              <a:rPr lang="en-US" sz="1350" b="0" i="0" dirty="0">
+                <a:solidFill>
+                  <a:srgbClr val="222222"/>
+                </a:solidFill>
+                <a:effectLst/>
+                <a:latin typeface="Arial" panose="020B0604020202020204" pitchFamily="34" charset="0"/>
+              </a:rPr>
+              <a:t>(top) Wickham, H., &amp; Grolemund, G. (2016). </a:t>
+            </a:r>
+            <a:r>
+              <a:rPr lang="en-US" sz="1350" b="0" i="1" dirty="0">
+                <a:solidFill>
+                  <a:srgbClr val="222222"/>
+                </a:solidFill>
+                <a:effectLst/>
+                <a:latin typeface="Arial" panose="020B0604020202020204" pitchFamily="34" charset="0"/>
+              </a:rPr>
+              <a:t>R for data science. </a:t>
+            </a:r>
+            <a:r>
+              <a:rPr lang="en-US" sz="1350" b="0" i="1" dirty="0">
+                <a:solidFill>
+                  <a:srgbClr val="222222"/>
+                </a:solidFill>
+                <a:effectLst/>
+                <a:latin typeface="Arial" panose="020B0604020202020204" pitchFamily="34" charset="0"/>
+                <a:hlinkClick r:id="rId4"/>
+              </a:rPr>
+              <a:t>https://r4ds.had.co.nz/</a:t>
+            </a:r>
+            <a:endParaRPr lang="en-US" sz="1350" b="0" i="1" dirty="0">
+              <a:solidFill>
+                <a:srgbClr val="222222"/>
+              </a:solidFill>
+              <a:effectLst/>
+              <a:latin typeface="Arial" panose="020B0604020202020204" pitchFamily="34" charset="0"/>
+            </a:endParaRPr>
+          </a:p>
+          <a:p>
+            <a:r>
+              <a:rPr lang="en-US" sz="1350" b="0" dirty="0">
+                <a:solidFill>
+                  <a:srgbClr val="333333"/>
+                </a:solidFill>
+                <a:effectLst/>
+                <a:latin typeface="Arial" panose="020B0604020202020204" pitchFamily="34" charset="0"/>
+                <a:cs typeface="Arial" panose="020B0604020202020204" pitchFamily="34" charset="0"/>
+              </a:rPr>
+              <a:t>(bottom) Biecek P. &amp; Burzykowski T. (2020). </a:t>
+            </a:r>
+            <a:r>
+              <a:rPr lang="en-US" sz="1350" i="1" dirty="0">
+                <a:solidFill>
+                  <a:srgbClr val="333333"/>
+                </a:solidFill>
+                <a:effectLst/>
+                <a:latin typeface="Arial" panose="020B0604020202020204" pitchFamily="34" charset="0"/>
+                <a:cs typeface="Arial" panose="020B0604020202020204" pitchFamily="34" charset="0"/>
+              </a:rPr>
+              <a:t>Explanatory Model Analysis</a:t>
+            </a:r>
+            <a:r>
+              <a:rPr lang="en-US" sz="1350" i="1" dirty="0">
+                <a:solidFill>
+                  <a:srgbClr val="333333"/>
+                </a:solidFill>
+                <a:latin typeface="Arial" panose="020B0604020202020204" pitchFamily="34" charset="0"/>
+                <a:cs typeface="Arial" panose="020B0604020202020204" pitchFamily="34" charset="0"/>
+              </a:rPr>
+              <a:t>.</a:t>
+            </a:r>
+            <a:r>
+              <a:rPr lang="en-US" sz="1350" b="0" i="1" dirty="0">
+                <a:solidFill>
+                  <a:srgbClr val="333333"/>
+                </a:solidFill>
+                <a:effectLst/>
+                <a:latin typeface="Arial" panose="020B0604020202020204" pitchFamily="34" charset="0"/>
+                <a:cs typeface="Arial" panose="020B0604020202020204" pitchFamily="34" charset="0"/>
+              </a:rPr>
+              <a:t> </a:t>
+            </a:r>
+            <a:r>
+              <a:rPr lang="en-US" sz="1350" b="0" i="1" dirty="0">
+                <a:solidFill>
+                  <a:srgbClr val="333333"/>
+                </a:solidFill>
+                <a:effectLst/>
+                <a:latin typeface="Arial" panose="020B0604020202020204" pitchFamily="34" charset="0"/>
+                <a:cs typeface="Arial" panose="020B0604020202020204" pitchFamily="34" charset="0"/>
+                <a:hlinkClick r:id="rId5"/>
+              </a:rPr>
+              <a:t>http://ema.drwhy.ai/</a:t>
+            </a:r>
+            <a:endParaRPr lang="en-US" sz="1350" b="0" i="0" dirty="0">
+              <a:solidFill>
+                <a:srgbClr val="333333"/>
+              </a:solidFill>
+              <a:effectLst/>
+              <a:latin typeface="Arial" panose="020B0604020202020204" pitchFamily="34" charset="0"/>
+              <a:cs typeface="Arial" panose="020B0604020202020204" pitchFamily="34" charset="0"/>
+            </a:endParaRPr>
+          </a:p>
+          <a:p>
+            <a:pPr algn="l"/>
+            <a:r>
+              <a:rPr lang="en-US" sz="1350" dirty="0">
+                <a:latin typeface="Arial" panose="020B0604020202020204" pitchFamily="34" charset="0"/>
+                <a:cs typeface="Arial" panose="020B0604020202020204" pitchFamily="34" charset="0"/>
+              </a:rPr>
+              <a:t>(blue) proposed, N. Spyrison &amp; C. </a:t>
+            </a:r>
+            <a:r>
+              <a:rPr lang="en-US" sz="1350" dirty="0" err="1">
+                <a:latin typeface="Arial" panose="020B0604020202020204" pitchFamily="34" charset="0"/>
+                <a:cs typeface="Arial" panose="020B0604020202020204" pitchFamily="34" charset="0"/>
+              </a:rPr>
+              <a:t>Doogan</a:t>
+            </a:r>
+            <a:r>
+              <a:rPr lang="en-US" sz="1350" dirty="0">
+                <a:latin typeface="Arial" panose="020B0604020202020204" pitchFamily="34" charset="0"/>
+                <a:cs typeface="Arial" panose="020B0604020202020204" pitchFamily="34" charset="0"/>
+              </a:rPr>
+              <a:t>  </a:t>
+            </a:r>
+          </a:p>
+        </p:txBody>
+      </p:sp>
+    </p:spTree>
+    <p:extLst>
+      <p:ext uri="{BB962C8B-B14F-4D97-AF65-F5344CB8AC3E}">
+        <p14:creationId xmlns:p14="http://schemas.microsoft.com/office/powerpoint/2010/main" val="3080668156"/>
+      </p:ext>
+    </p:extLst>
+  </p:cSld>
+  <p:clrMapOvr>
+    <a:masterClrMapping/>
+  </p:clrMapOvr>
+</p:sld>
+</file>
+
+<file path=ppt/slides/slide6.xml><?xml version="1.0" encoding="utf-8"?>
+<p:sld xmlns:a="http://schemas.openxmlformats.org/drawingml/2006/main" xmlns:r="http://schemas.openxmlformats.org/officeDocument/2006/relationships" xmlns:p="http://schemas.openxmlformats.org/presentationml/2006/main">
+  <p:cSld>
+    <p:spTree>
+      <p:nvGrpSpPr>
+        <p:cNvPr id="1" name=""/>
+        <p:cNvGrpSpPr/>
+        <p:nvPr/>
+      </p:nvGrpSpPr>
+      <p:grpSpPr>
+        <a:xfrm>
+          <a:off x="0" y="0"/>
+          <a:ext cx="0" cy="0"/>
+          <a:chOff x="0" y="0"/>
+          <a:chExt cx="0" cy="0"/>
+        </a:xfrm>
+      </p:grpSpPr>
+      <p:sp>
+        <p:nvSpPr>
+          <p:cNvPr id="2" name="Title 1">
+            <a:extLst>
+              <a:ext uri="{FF2B5EF4-FFF2-40B4-BE49-F238E27FC236}">
+                <a16:creationId xmlns:a16="http://schemas.microsoft.com/office/drawing/2014/main" id="{53A274B9-0E0D-41A6-931C-02D896F19EEC}"/>
+              </a:ext>
+            </a:extLst>
+          </p:cNvPr>
+          <p:cNvSpPr>
+            <a:spLocks noGrp="1"/>
+          </p:cNvSpPr>
+          <p:nvPr>
+            <p:ph type="title"/>
+          </p:nvPr>
+        </p:nvSpPr>
+        <p:spPr/>
+        <p:txBody>
+          <a:bodyPr/>
+          <a:lstStyle/>
+          <a:p>
+            <a:endParaRPr lang="en-US"/>
+          </a:p>
+        </p:txBody>
+      </p:sp>
+      <p:sp>
+        <p:nvSpPr>
+          <p:cNvPr id="3" name="Content Placeholder 2">
+            <a:extLst>
+              <a:ext uri="{FF2B5EF4-FFF2-40B4-BE49-F238E27FC236}">
+                <a16:creationId xmlns:a16="http://schemas.microsoft.com/office/drawing/2014/main" id="{1E9E8D39-1A92-4387-A187-3FCC881EC8FC}"/>
+              </a:ext>
+            </a:extLst>
+          </p:cNvPr>
+          <p:cNvSpPr>
+            <a:spLocks noGrp="1"/>
+          </p:cNvSpPr>
+          <p:nvPr>
+            <p:ph idx="1"/>
+          </p:nvPr>
+        </p:nvSpPr>
+        <p:spPr/>
+        <p:txBody>
+          <a:bodyPr/>
+          <a:lstStyle/>
+          <a:p>
+            <a:endParaRPr lang="en-US"/>
+          </a:p>
+        </p:txBody>
+      </p:sp>
+    </p:spTree>
+    <p:extLst>
+      <p:ext uri="{BB962C8B-B14F-4D97-AF65-F5344CB8AC3E}">
+        <p14:creationId xmlns:p14="http://schemas.microsoft.com/office/powerpoint/2010/main" val="2090958245"/>
+      </p:ext>
+    </p:extLst>
+  </p:cSld>
+  <p:clrMapOvr>
+    <a:masterClrMapping/>
+  </p:clrMapOvr>
+</p:sld>
+</file>
+
+<file path=ppt/slides/slide7.xml><?xml version="1.0" encoding="utf-8"?>
+<p:sld xmlns:a="http://schemas.openxmlformats.org/drawingml/2006/main" xmlns:r="http://schemas.openxmlformats.org/officeDocument/2006/relationships" xmlns:p="http://schemas.openxmlformats.org/presentationml/2006/main">
+  <p:cSld>
+    <p:spTree>
+      <p:nvGrpSpPr>
+        <p:cNvPr id="1" name=""/>
+        <p:cNvGrpSpPr/>
+        <p:nvPr/>
+      </p:nvGrpSpPr>
+      <p:grpSpPr>
+        <a:xfrm>
+          <a:off x="0" y="0"/>
+          <a:ext cx="0" cy="0"/>
+          <a:chOff x="0" y="0"/>
+          <a:chExt cx="0" cy="0"/>
+        </a:xfrm>
+      </p:grpSpPr>
+      <p:sp>
+        <p:nvSpPr>
+          <p:cNvPr id="2" name="Title 1">
+            <a:extLst>
+              <a:ext uri="{FF2B5EF4-FFF2-40B4-BE49-F238E27FC236}">
+                <a16:creationId xmlns:a16="http://schemas.microsoft.com/office/drawing/2014/main" id="{F38289A5-E4D5-4C4B-A4A7-DDAE7591A4C7}"/>
+              </a:ext>
+            </a:extLst>
+          </p:cNvPr>
+          <p:cNvSpPr>
+            <a:spLocks noGrp="1"/>
+          </p:cNvSpPr>
+          <p:nvPr>
+            <p:ph type="title"/>
+          </p:nvPr>
+        </p:nvSpPr>
+        <p:spPr/>
+        <p:txBody>
+          <a:bodyPr/>
+          <a:lstStyle/>
+          <a:p>
+            <a:r>
+              <a:rPr lang="en-AU" dirty="0"/>
+              <a:t>Layout – ML EDA</a:t>
+            </a:r>
+            <a:endParaRPr lang="en-US" dirty="0"/>
+          </a:p>
+        </p:txBody>
+      </p:sp>
+      <p:sp>
+        <p:nvSpPr>
+          <p:cNvPr id="3" name="Content Placeholder 2">
+            <a:extLst>
+              <a:ext uri="{FF2B5EF4-FFF2-40B4-BE49-F238E27FC236}">
+                <a16:creationId xmlns:a16="http://schemas.microsoft.com/office/drawing/2014/main" id="{B094FDBC-AA56-4A65-8AAA-51664F20CBA8}"/>
+              </a:ext>
+            </a:extLst>
+          </p:cNvPr>
+          <p:cNvSpPr>
+            <a:spLocks noGrp="1"/>
+          </p:cNvSpPr>
+          <p:nvPr>
+            <p:ph idx="1"/>
+          </p:nvPr>
+        </p:nvSpPr>
+        <p:spPr>
+          <a:xfrm>
+            <a:off x="838200" y="1825625"/>
+            <a:ext cx="10515600" cy="4859260"/>
+          </a:xfrm>
+        </p:spPr>
+        <p:txBody>
+          <a:bodyPr>
+            <a:normAutofit lnSpcReduction="10000"/>
+          </a:bodyPr>
+          <a:lstStyle/>
+          <a:p>
+            <a:pPr marL="514350" indent="-514350">
+              <a:buFont typeface="+mj-lt"/>
+              <a:buAutoNum type="arabicPeriod"/>
+            </a:pPr>
+            <a:r>
+              <a:rPr lang="en-AU" dirty="0"/>
+              <a:t>Input data, pre-processing step, summarize, select target variables</a:t>
+            </a:r>
+          </a:p>
+          <a:p>
+            <a:pPr marL="514350" indent="-514350">
+              <a:buFont typeface="+mj-lt"/>
+              <a:buAutoNum type="arabicPeriod"/>
+            </a:pPr>
+            <a:r>
+              <a:rPr lang="en-AU" dirty="0"/>
+              <a:t>Use {</a:t>
+            </a:r>
+            <a:r>
+              <a:rPr lang="en-AU" dirty="0" err="1"/>
+              <a:t>Rdimtools</a:t>
+            </a:r>
+            <a:r>
+              <a:rPr lang="en-AU" dirty="0"/>
+              <a:t>} to estimate the internal data dimensionally, </a:t>
+            </a:r>
+            <a:r>
+              <a:rPr lang="en-AU" dirty="0" err="1"/>
+              <a:t>idd</a:t>
+            </a:r>
+            <a:r>
+              <a:rPr lang="en-AU" dirty="0"/>
+              <a:t>^</a:t>
+            </a:r>
+          </a:p>
+          <a:p>
+            <a:pPr marL="514350" indent="-514350">
+              <a:buFont typeface="+mj-lt"/>
+              <a:buAutoNum type="arabicPeriod"/>
+            </a:pPr>
+            <a:r>
+              <a:rPr lang="en-AU" dirty="0"/>
+              <a:t>Create a stepwise tour; initialize </a:t>
+            </a:r>
+            <a:r>
+              <a:rPr lang="en-AU" dirty="0" err="1"/>
+              <a:t>pca</a:t>
+            </a:r>
+            <a:r>
+              <a:rPr lang="en-AU" dirty="0"/>
+              <a:t>/</a:t>
+            </a:r>
+            <a:r>
+              <a:rPr lang="en-AU" dirty="0" err="1"/>
+              <a:t>olda</a:t>
+            </a:r>
+            <a:r>
+              <a:rPr lang="en-AU" dirty="0"/>
+              <a:t>-space and basis, display at p = </a:t>
+            </a:r>
+            <a:r>
+              <a:rPr lang="en-AU" dirty="0" err="1"/>
+              <a:t>idd</a:t>
+            </a:r>
+            <a:r>
+              <a:rPr lang="en-AU" dirty="0"/>
+              <a:t>^, as part of ensemble graphics[Unwin, 2018] for EDA before ML.</a:t>
+            </a:r>
+            <a:endParaRPr lang="en-US" dirty="0"/>
+          </a:p>
+          <a:p>
+            <a:pPr lvl="1"/>
+            <a:r>
+              <a:rPr lang="en-US" dirty="0"/>
+              <a:t>Step wise tour -&gt; local tour/grand tour, </a:t>
+            </a:r>
+            <a:r>
+              <a:rPr lang="en-US" dirty="0" err="1"/>
+              <a:t>tsne</a:t>
+            </a:r>
+            <a:r>
+              <a:rPr lang="en-US" dirty="0"/>
+              <a:t> or </a:t>
+            </a:r>
+            <a:r>
+              <a:rPr lang="en-US" dirty="0" err="1"/>
+              <a:t>umap</a:t>
+            </a:r>
+            <a:r>
+              <a:rPr lang="en-US" dirty="0"/>
+              <a:t>, PC density, etc.</a:t>
+            </a:r>
+          </a:p>
+          <a:p>
+            <a:pPr lvl="1"/>
+            <a:r>
+              <a:rPr lang="en-US" dirty="0"/>
+              <a:t>Tooltip pointing back to observations in the original data space</a:t>
+            </a:r>
+          </a:p>
+          <a:p>
+            <a:pPr lvl="1"/>
+            <a:r>
+              <a:rPr lang="en-US" dirty="0"/>
+              <a:t>Options for occlusion, k2Density, alpha~1/density, etc.</a:t>
+            </a:r>
+          </a:p>
+          <a:p>
+            <a:pPr marL="514350" indent="-514350">
+              <a:buFont typeface="+mj-lt"/>
+              <a:buAutoNum type="arabicPeriod"/>
+            </a:pPr>
+            <a:r>
+              <a:rPr lang="en-US" dirty="0"/>
+              <a:t>Export</a:t>
+            </a:r>
+          </a:p>
+          <a:p>
+            <a:pPr lvl="1"/>
+            <a:r>
+              <a:rPr lang="en-US" dirty="0"/>
+              <a:t>Embedded PC-space</a:t>
+            </a:r>
+          </a:p>
+          <a:p>
+            <a:pPr lvl="1"/>
+            <a:r>
+              <a:rPr lang="en-US" dirty="0"/>
+              <a:t>Preprocessed data</a:t>
+            </a:r>
+          </a:p>
+          <a:p>
+            <a:pPr lvl="1"/>
+            <a:r>
+              <a:rPr lang="en-AU" dirty="0"/>
+              <a:t>ensemble graphics</a:t>
+            </a:r>
+            <a:endParaRPr lang="en-US" dirty="0"/>
+          </a:p>
+          <a:p>
+            <a:pPr lvl="1"/>
+            <a:endParaRPr lang="en-AU" dirty="0"/>
+          </a:p>
+        </p:txBody>
+      </p:sp>
+    </p:spTree>
+    <p:extLst>
+      <p:ext uri="{BB962C8B-B14F-4D97-AF65-F5344CB8AC3E}">
+        <p14:creationId xmlns:p14="http://schemas.microsoft.com/office/powerpoint/2010/main" val="441165755"/>
+      </p:ext>
+    </p:extLst>
+  </p:cSld>
+  <p:clrMapOvr>
+    <a:masterClrMapping/>
+  </p:clrMapOvr>
+</p:sld>
+</file>
+
+<file path=ppt/slides/slide8.xml><?xml version="1.0" encoding="utf-8"?>
+<p:sld xmlns:a="http://schemas.openxmlformats.org/drawingml/2006/main" xmlns:r="http://schemas.openxmlformats.org/officeDocument/2006/relationships" xmlns:p="http://schemas.openxmlformats.org/presentationml/2006/main">
+  <p:cSld>
+    <p:spTree>
+      <p:nvGrpSpPr>
+        <p:cNvPr id="1" name=""/>
+        <p:cNvGrpSpPr/>
+        <p:nvPr/>
+      </p:nvGrpSpPr>
+      <p:grpSpPr>
+        <a:xfrm>
+          <a:off x="0" y="0"/>
+          <a:ext cx="0" cy="0"/>
+          <a:chOff x="0" y="0"/>
+          <a:chExt cx="0" cy="0"/>
+        </a:xfrm>
+      </p:grpSpPr>
       <p:sp>
         <p:nvSpPr>
           <p:cNvPr id="4" name="Rectangle: Rounded Corners 3">
@@ -4579,15 +6638,7 @@
           <a:p>
             <a:r>
               <a:rPr lang="en-US" dirty="0"/>
-              <a:t>- </a:t>
-            </a:r>
-            <a:r>
-              <a:rPr lang="en-US" dirty="0" err="1"/>
-              <a:t>tSNE</a:t>
-            </a:r>
-            <a:r>
-              <a:rPr lang="en-US" dirty="0"/>
-              <a:t> with hyperparameters</a:t>
+              <a:t>- tSNE with hyperparameters</a:t>
             </a:r>
           </a:p>
           <a:p>
@@ -4689,7 +6740,7 @@
 </p:sld>
 </file>
 
-<file path=ppt/slides/slide5.xml><?xml version="1.0" encoding="utf-8"?>
+<file path=ppt/slides/slide9.xml><?xml version="1.0" encoding="utf-8"?>
 <p:sld xmlns:a="http://schemas.openxmlformats.org/drawingml/2006/main" xmlns:r="http://schemas.openxmlformats.org/officeDocument/2006/relationships" xmlns:p="http://schemas.openxmlformats.org/presentationml/2006/main">
   <p:cSld>
     <p:spTree>
@@ -4876,651 +6927,6 @@
     <p:extLst>
       <p:ext uri="{BB962C8B-B14F-4D97-AF65-F5344CB8AC3E}">
         <p14:creationId xmlns:p14="http://schemas.microsoft.com/office/powerpoint/2010/main" val="1672286348"/>
-      </p:ext>
-    </p:extLst>
-  </p:cSld>
-  <p:clrMapOvr>
-    <a:masterClrMapping/>
-  </p:clrMapOvr>
-</p:sld>
-</file>
-
-<file path=ppt/slides/slide6.xml><?xml version="1.0" encoding="utf-8"?>
-<p:sld xmlns:a="http://schemas.openxmlformats.org/drawingml/2006/main" xmlns:r="http://schemas.openxmlformats.org/officeDocument/2006/relationships" xmlns:p="http://schemas.openxmlformats.org/presentationml/2006/main">
-  <p:cSld>
-    <p:spTree>
-      <p:nvGrpSpPr>
-        <p:cNvPr id="1" name=""/>
-        <p:cNvGrpSpPr/>
-        <p:nvPr/>
-      </p:nvGrpSpPr>
-      <p:grpSpPr>
-        <a:xfrm>
-          <a:off x="0" y="0"/>
-          <a:ext cx="0" cy="0"/>
-          <a:chOff x="0" y="0"/>
-          <a:chExt cx="0" cy="0"/>
-        </a:xfrm>
-      </p:grpSpPr>
-      <p:sp>
-        <p:nvSpPr>
-          <p:cNvPr id="2" name="Title 1">
-            <a:extLst>
-              <a:ext uri="{FF2B5EF4-FFF2-40B4-BE49-F238E27FC236}">
-                <a16:creationId xmlns:a16="http://schemas.microsoft.com/office/drawing/2014/main" id="{EB6F2D7F-7080-415A-BA17-D9F66D57063E}"/>
-              </a:ext>
-            </a:extLst>
-          </p:cNvPr>
-          <p:cNvSpPr>
-            <a:spLocks noGrp="1"/>
-          </p:cNvSpPr>
-          <p:nvPr>
-            <p:ph type="title"/>
-          </p:nvPr>
-        </p:nvSpPr>
-        <p:spPr/>
-        <p:txBody>
-          <a:bodyPr/>
-          <a:lstStyle/>
-          <a:p>
-            <a:r>
-              <a:rPr lang="en-US" dirty="0"/>
-              <a:t>Shiny app to facilitate EDA and proper PC embedding before ML?</a:t>
-            </a:r>
-          </a:p>
-        </p:txBody>
-      </p:sp>
-      <p:sp>
-        <p:nvSpPr>
-          <p:cNvPr id="3" name="Content Placeholder 2">
-            <a:extLst>
-              <a:ext uri="{FF2B5EF4-FFF2-40B4-BE49-F238E27FC236}">
-                <a16:creationId xmlns:a16="http://schemas.microsoft.com/office/drawing/2014/main" id="{90CC40C4-5EF3-4D5D-B8A8-29DB20A1BC72}"/>
-              </a:ext>
-            </a:extLst>
-          </p:cNvPr>
-          <p:cNvSpPr>
-            <a:spLocks noGrp="1"/>
-          </p:cNvSpPr>
-          <p:nvPr>
-            <p:ph idx="1"/>
-          </p:nvPr>
-        </p:nvSpPr>
-        <p:spPr/>
-        <p:txBody>
-          <a:bodyPr numCol="2"/>
-          <a:lstStyle/>
-          <a:p>
-            <a:pPr marL="0" indent="0">
-              <a:buNone/>
-            </a:pPr>
-            <a:r>
-              <a:rPr lang="en-US" dirty="0"/>
-              <a:t>Pros</a:t>
-            </a:r>
-          </a:p>
-          <a:p>
-            <a:pPr>
-              <a:buFontTx/>
-              <a:buChar char="-"/>
-            </a:pPr>
-            <a:r>
-              <a:rPr lang="en-US" dirty="0"/>
-              <a:t>Save run &amp; iteration time</a:t>
-            </a:r>
-          </a:p>
-          <a:p>
-            <a:pPr>
-              <a:buFontTx/>
-              <a:buChar char="-"/>
-            </a:pPr>
-            <a:r>
-              <a:rPr lang="en-US" dirty="0"/>
-              <a:t>Improved EDA</a:t>
-            </a:r>
-          </a:p>
-          <a:p>
-            <a:pPr marL="0" indent="0">
-              <a:buNone/>
-            </a:pPr>
-            <a:r>
-              <a:rPr lang="en-US" dirty="0"/>
-              <a:t>- Suggest smarter hyperparameters or altogether bypass some</a:t>
-            </a:r>
-          </a:p>
-          <a:p>
-            <a:pPr marL="0" indent="0">
-              <a:buNone/>
-            </a:pPr>
-            <a:r>
-              <a:rPr lang="en-US" dirty="0"/>
-              <a:t>- Free &amp;Opensource</a:t>
-            </a:r>
-          </a:p>
-          <a:p>
-            <a:pPr marL="0" indent="0">
-              <a:buNone/>
-            </a:pPr>
-            <a:endParaRPr lang="en-US" dirty="0"/>
-          </a:p>
-          <a:p>
-            <a:pPr marL="0" indent="0">
-              <a:buNone/>
-            </a:pPr>
-            <a:endParaRPr lang="en-US" dirty="0"/>
-          </a:p>
-          <a:p>
-            <a:pPr marL="0" indent="0">
-              <a:buNone/>
-            </a:pPr>
-            <a:r>
-              <a:rPr lang="en-US" dirty="0"/>
-              <a:t>Cons</a:t>
-            </a:r>
-          </a:p>
-          <a:p>
-            <a:pPr>
-              <a:buFontTx/>
-              <a:buChar char="-"/>
-            </a:pPr>
-            <a:r>
-              <a:rPr lang="en-US" dirty="0"/>
-              <a:t>Limited flexibility for end user;</a:t>
-            </a:r>
-          </a:p>
-          <a:p>
-            <a:pPr marL="0" indent="0">
-              <a:buNone/>
-            </a:pPr>
-            <a:r>
-              <a:rPr lang="en-US" dirty="0"/>
-              <a:t>can’t handle unexpected cases</a:t>
-            </a:r>
-          </a:p>
-          <a:p>
-            <a:pPr>
-              <a:buFontTx/>
-              <a:buChar char="-"/>
-            </a:pPr>
-            <a:r>
-              <a:rPr lang="en-US" dirty="0"/>
-              <a:t>PC output more abstract than orthogonal variable, but going into black box model anyway. Consider </a:t>
-            </a:r>
-            <a:r>
-              <a:rPr lang="en-US" dirty="0" err="1"/>
-              <a:t>varible</a:t>
-            </a:r>
-            <a:r>
-              <a:rPr lang="en-US" dirty="0"/>
-              <a:t> output as well.</a:t>
-            </a:r>
-          </a:p>
-          <a:p>
-            <a:pPr>
-              <a:buFontTx/>
-              <a:buChar char="-"/>
-            </a:pPr>
-            <a:endParaRPr lang="en-US" dirty="0"/>
-          </a:p>
-        </p:txBody>
-      </p:sp>
-    </p:spTree>
-    <p:extLst>
-      <p:ext uri="{BB962C8B-B14F-4D97-AF65-F5344CB8AC3E}">
-        <p14:creationId xmlns:p14="http://schemas.microsoft.com/office/powerpoint/2010/main" val="1138983078"/>
-      </p:ext>
-    </p:extLst>
-  </p:cSld>
-  <p:clrMapOvr>
-    <a:masterClrMapping/>
-  </p:clrMapOvr>
-</p:sld>
-</file>
-
-<file path=ppt/slides/slide7.xml><?xml version="1.0" encoding="utf-8"?>
-<p:sld xmlns:a="http://schemas.openxmlformats.org/drawingml/2006/main" xmlns:r="http://schemas.openxmlformats.org/officeDocument/2006/relationships" xmlns:p="http://schemas.openxmlformats.org/presentationml/2006/main">
-  <p:cSld>
-    <p:spTree>
-      <p:nvGrpSpPr>
-        <p:cNvPr id="1" name=""/>
-        <p:cNvGrpSpPr/>
-        <p:nvPr/>
-      </p:nvGrpSpPr>
-      <p:grpSpPr>
-        <a:xfrm>
-          <a:off x="0" y="0"/>
-          <a:ext cx="0" cy="0"/>
-          <a:chOff x="0" y="0"/>
-          <a:chExt cx="0" cy="0"/>
-        </a:xfrm>
-      </p:grpSpPr>
-      <p:sp>
-        <p:nvSpPr>
-          <p:cNvPr id="2" name="Title 1">
-            <a:extLst>
-              <a:ext uri="{FF2B5EF4-FFF2-40B4-BE49-F238E27FC236}">
-                <a16:creationId xmlns:a16="http://schemas.microsoft.com/office/drawing/2014/main" id="{7CF60418-073B-4C10-948F-E1E952AF1277}"/>
-              </a:ext>
-            </a:extLst>
-          </p:cNvPr>
-          <p:cNvSpPr>
-            <a:spLocks noGrp="1"/>
-          </p:cNvSpPr>
-          <p:nvPr>
-            <p:ph type="title"/>
-          </p:nvPr>
-        </p:nvSpPr>
-        <p:spPr/>
-        <p:txBody>
-          <a:bodyPr/>
-          <a:lstStyle/>
-          <a:p>
-            <a:r>
-              <a:rPr lang="en-US" dirty="0"/>
-              <a:t>Notes</a:t>
-            </a:r>
-          </a:p>
-        </p:txBody>
-      </p:sp>
-      <p:sp>
-        <p:nvSpPr>
-          <p:cNvPr id="3" name="Content Placeholder 2">
-            <a:extLst>
-              <a:ext uri="{FF2B5EF4-FFF2-40B4-BE49-F238E27FC236}">
-                <a16:creationId xmlns:a16="http://schemas.microsoft.com/office/drawing/2014/main" id="{66F3D042-BAA9-4B58-82A6-92A673869CA8}"/>
-              </a:ext>
-            </a:extLst>
-          </p:cNvPr>
-          <p:cNvSpPr>
-            <a:spLocks noGrp="1"/>
-          </p:cNvSpPr>
-          <p:nvPr>
-            <p:ph idx="1"/>
-          </p:nvPr>
-        </p:nvSpPr>
-        <p:spPr/>
-        <p:txBody>
-          <a:bodyPr>
-            <a:normAutofit/>
-          </a:bodyPr>
-          <a:lstStyle/>
-          <a:p>
-            <a:r>
-              <a:rPr lang="en-US" dirty="0"/>
-              <a:t>Remember half baked spinifex apps including gallery, DT table.</a:t>
-            </a:r>
-          </a:p>
-          <a:p>
-            <a:r>
-              <a:rPr lang="en-US" dirty="0"/>
-              <a:t>Good use of: </a:t>
-            </a:r>
-            <a:r>
-              <a:rPr lang="en-US" dirty="0" err="1"/>
-              <a:t>Shinythemes</a:t>
-            </a:r>
-            <a:r>
-              <a:rPr lang="en-US" dirty="0"/>
-              <a:t>, </a:t>
-            </a:r>
-            <a:r>
-              <a:rPr lang="en-US" dirty="0" err="1"/>
-              <a:t>shinyJS</a:t>
-            </a:r>
-            <a:r>
-              <a:rPr lang="en-US" dirty="0"/>
-              <a:t>, notifications.</a:t>
-            </a:r>
-          </a:p>
-          <a:p>
-            <a:r>
-              <a:rPr lang="en-US" dirty="0"/>
-              <a:t>Plots as </a:t>
-            </a:r>
-            <a:r>
-              <a:rPr lang="en-US" dirty="0" err="1"/>
-              <a:t>plotly</a:t>
-            </a:r>
-            <a:r>
-              <a:rPr lang="en-US" dirty="0"/>
-              <a:t> </a:t>
-            </a:r>
-            <a:r>
-              <a:rPr lang="en-US" dirty="0" err="1"/>
-              <a:t>objs</a:t>
-            </a:r>
-            <a:r>
-              <a:rPr lang="en-US" dirty="0"/>
-              <a:t>? Look into Carson S’s UseR2018 workshop.</a:t>
-            </a:r>
-          </a:p>
-          <a:p>
-            <a:r>
-              <a:rPr lang="en-US" dirty="0"/>
-              <a:t>Make sure to review Liminal (errors from main 2 tour options, last push Oct 2020?)</a:t>
-            </a:r>
-          </a:p>
-          <a:p>
-            <a:endParaRPr lang="en-US" dirty="0"/>
-          </a:p>
-          <a:p>
-            <a:pPr marL="0" indent="0">
-              <a:buNone/>
-            </a:pPr>
-            <a:endParaRPr lang="en-US" dirty="0"/>
-          </a:p>
-        </p:txBody>
-      </p:sp>
-    </p:spTree>
-    <p:extLst>
-      <p:ext uri="{BB962C8B-B14F-4D97-AF65-F5344CB8AC3E}">
-        <p14:creationId xmlns:p14="http://schemas.microsoft.com/office/powerpoint/2010/main" val="4215079279"/>
-      </p:ext>
-    </p:extLst>
-  </p:cSld>
-  <p:clrMapOvr>
-    <a:masterClrMapping/>
-  </p:clrMapOvr>
-</p:sld>
-</file>
-
-<file path=ppt/slides/slide8.xml><?xml version="1.0" encoding="utf-8"?>
-<p:sld xmlns:a="http://schemas.openxmlformats.org/drawingml/2006/main" xmlns:r="http://schemas.openxmlformats.org/officeDocument/2006/relationships" xmlns:p="http://schemas.openxmlformats.org/presentationml/2006/main">
-  <p:cSld>
-    <p:spTree>
-      <p:nvGrpSpPr>
-        <p:cNvPr id="1" name=""/>
-        <p:cNvGrpSpPr/>
-        <p:nvPr/>
-      </p:nvGrpSpPr>
-      <p:grpSpPr>
-        <a:xfrm>
-          <a:off x="0" y="0"/>
-          <a:ext cx="0" cy="0"/>
-          <a:chOff x="0" y="0"/>
-          <a:chExt cx="0" cy="0"/>
-        </a:xfrm>
-      </p:grpSpPr>
-      <p:sp>
-        <p:nvSpPr>
-          <p:cNvPr id="2" name="Title 1">
-            <a:extLst>
-              <a:ext uri="{FF2B5EF4-FFF2-40B4-BE49-F238E27FC236}">
-                <a16:creationId xmlns:a16="http://schemas.microsoft.com/office/drawing/2014/main" id="{86F9D6D2-E472-406B-AB54-6DF1D760D98C}"/>
-              </a:ext>
-            </a:extLst>
-          </p:cNvPr>
-          <p:cNvSpPr>
-            <a:spLocks noGrp="1"/>
-          </p:cNvSpPr>
-          <p:nvPr>
-            <p:ph type="title"/>
-          </p:nvPr>
-        </p:nvSpPr>
-        <p:spPr/>
-        <p:txBody>
-          <a:bodyPr/>
-          <a:lstStyle/>
-          <a:p>
-            <a:r>
-              <a:rPr lang="en-US" dirty="0" err="1"/>
-              <a:t>tSNE</a:t>
-            </a:r>
-            <a:r>
-              <a:rPr lang="en-US" dirty="0"/>
-              <a:t> and multivariate viz </a:t>
-            </a:r>
-            <a:r>
-              <a:rPr lang="en-US" dirty="0" err="1"/>
-              <a:t>implementaions</a:t>
-            </a:r>
-            <a:endParaRPr lang="en-US" dirty="0"/>
-          </a:p>
-        </p:txBody>
-      </p:sp>
-      <p:sp>
-        <p:nvSpPr>
-          <p:cNvPr id="3" name="Content Placeholder 2">
-            <a:extLst>
-              <a:ext uri="{FF2B5EF4-FFF2-40B4-BE49-F238E27FC236}">
-                <a16:creationId xmlns:a16="http://schemas.microsoft.com/office/drawing/2014/main" id="{0A84A87C-FF78-4A4A-875D-7EB1B1B30DE2}"/>
-              </a:ext>
-            </a:extLst>
-          </p:cNvPr>
-          <p:cNvSpPr>
-            <a:spLocks noGrp="1"/>
-          </p:cNvSpPr>
-          <p:nvPr>
-            <p:ph idx="1"/>
-          </p:nvPr>
-        </p:nvSpPr>
-        <p:spPr/>
-        <p:txBody>
-          <a:bodyPr>
-            <a:normAutofit fontScale="32500" lnSpcReduction="20000"/>
-          </a:bodyPr>
-          <a:lstStyle/>
-          <a:p>
-            <a:r>
-              <a:rPr lang="en-US" dirty="0"/>
-              <a:t>Blog, parameterization: </a:t>
-            </a:r>
-            <a:r>
-              <a:rPr lang="en-US" dirty="0">
-                <a:hlinkClick r:id="rId2"/>
-              </a:rPr>
-              <a:t>https://jef.works/blog/2018/04/10/interactive-tsne/</a:t>
-            </a:r>
-            <a:endParaRPr lang="en-US" dirty="0"/>
-          </a:p>
-          <a:p>
-            <a:r>
-              <a:rPr lang="en-US" dirty="0"/>
-              <a:t>Blog, vignette: https://www.kaggle.com/maniyar2jaimin/interactive-plotly-guide-to-pca-lda-t-sne</a:t>
-            </a:r>
-          </a:p>
-          <a:p>
-            <a:r>
-              <a:rPr lang="en-US" dirty="0">
-                <a:hlinkClick r:id="rId3"/>
-              </a:rPr>
-              <a:t>https://cs.stanford.edu/people/karpathy/tsnejs/csvdemo.html</a:t>
-            </a:r>
-            <a:r>
-              <a:rPr lang="en-US" dirty="0"/>
-              <a:t> </a:t>
-            </a:r>
-          </a:p>
-          <a:p>
-            <a:pPr lvl="1"/>
-            <a:r>
-              <a:rPr lang="en-US" dirty="0"/>
-              <a:t>tweets</a:t>
-            </a:r>
-          </a:p>
-          <a:p>
-            <a:r>
-              <a:rPr lang="en-US" dirty="0">
-                <a:hlinkClick r:id="rId4"/>
-              </a:rPr>
-              <a:t>https://distill.pub/2016/misread-tsne/</a:t>
-            </a:r>
-            <a:r>
-              <a:rPr lang="en-US" dirty="0"/>
-              <a:t>]</a:t>
-            </a:r>
-          </a:p>
-          <a:p>
-            <a:r>
-              <a:rPr lang="en-US" dirty="0">
-                <a:hlinkClick r:id="rId5"/>
-              </a:rPr>
-              <a:t>https://sirselim.github.io/tSNE_plotting/</a:t>
-            </a:r>
-            <a:endParaRPr lang="en-US" dirty="0"/>
-          </a:p>
-          <a:p>
-            <a:pPr lvl="1"/>
-            <a:r>
-              <a:rPr lang="en-US" dirty="0"/>
-              <a:t>paper: https://github.com/sirselim/immunecell_methylation_paper_data</a:t>
-            </a:r>
-          </a:p>
-          <a:p>
-            <a:r>
-              <a:rPr lang="en-US" dirty="0">
-                <a:hlinkClick r:id="rId6"/>
-              </a:rPr>
-              <a:t>https://cs.stanford.edu/people/karpathy/tsnejs/</a:t>
-            </a:r>
-            <a:endParaRPr lang="en-US" dirty="0"/>
-          </a:p>
-          <a:p>
-            <a:endParaRPr lang="en-US" dirty="0"/>
-          </a:p>
-          <a:p>
-            <a:r>
-              <a:rPr lang="en-US" dirty="0">
-                <a:hlinkClick r:id="rId7"/>
-              </a:rPr>
-              <a:t>https://nicola17.github.io/tfjs-tsne-demo/</a:t>
-            </a:r>
-            <a:endParaRPr lang="en-US" dirty="0"/>
-          </a:p>
-          <a:p>
-            <a:pPr lvl="1"/>
-            <a:r>
-              <a:rPr lang="en-US" dirty="0"/>
-              <a:t>Blog: </a:t>
-            </a:r>
-            <a:r>
-              <a:rPr lang="en-US" dirty="0">
-                <a:hlinkClick r:id="rId7"/>
-              </a:rPr>
-              <a:t>https://ai.googleblog.com/2018/06/realtime-tsne-visualizations-with.html</a:t>
-            </a:r>
-            <a:endParaRPr lang="en-US" dirty="0"/>
-          </a:p>
-          <a:p>
-            <a:pPr lvl="1"/>
-            <a:r>
-              <a:rPr lang="en-US" dirty="0"/>
-              <a:t>Paper: </a:t>
-            </a:r>
-            <a:r>
-              <a:rPr lang="en-US" dirty="0">
-                <a:hlinkClick r:id="rId8"/>
-              </a:rPr>
-              <a:t>https://arxiv.org/abs/1805.10817</a:t>
-            </a:r>
-            <a:endParaRPr lang="en-US" dirty="0"/>
-          </a:p>
-          <a:p>
-            <a:pPr lvl="1"/>
-            <a:r>
-              <a:rPr lang="en-US" dirty="0"/>
-              <a:t>VIS 2019 pptx</a:t>
-            </a:r>
-          </a:p>
-          <a:p>
-            <a:r>
-              <a:rPr lang="en-US" dirty="0"/>
-              <a:t>Paper: </a:t>
-            </a:r>
-            <a:r>
-              <a:rPr lang="en-US" dirty="0">
-                <a:hlinkClick r:id="rId9"/>
-              </a:rPr>
-              <a:t>https://arxiv.org/pdf/2002.06910.pdf</a:t>
-            </a:r>
-            <a:endParaRPr lang="en-US" dirty="0"/>
-          </a:p>
-          <a:p>
-            <a:r>
-              <a:rPr lang="en-US" dirty="0"/>
-              <a:t>Hosting, shiny-like: </a:t>
-            </a:r>
-            <a:r>
-              <a:rPr lang="en-US" dirty="0">
-                <a:hlinkClick r:id="rId10"/>
-              </a:rPr>
-              <a:t>https://bokeh.org/</a:t>
-            </a:r>
-            <a:endParaRPr lang="en-US" dirty="0"/>
-          </a:p>
-          <a:p>
-            <a:r>
-              <a:rPr lang="en-US" dirty="0"/>
-              <a:t>Stand alone: </a:t>
-            </a:r>
-            <a:r>
-              <a:rPr lang="en-US" dirty="0">
-                <a:hlinkClick r:id="rId11"/>
-              </a:rPr>
-              <a:t>https://www.cytosplore.org/</a:t>
-            </a:r>
-            <a:endParaRPr lang="en-US" dirty="0"/>
-          </a:p>
-          <a:p>
-            <a:r>
-              <a:rPr lang="en-US" dirty="0"/>
-              <a:t>Stand alone: </a:t>
-            </a:r>
-            <a:r>
-              <a:rPr lang="en-US" dirty="0">
-                <a:hlinkClick r:id="rId12"/>
-              </a:rPr>
-              <a:t>https://glueviz.org/</a:t>
-            </a:r>
-            <a:endParaRPr lang="en-US" dirty="0"/>
-          </a:p>
-          <a:p>
-            <a:r>
-              <a:rPr lang="en-US" dirty="0"/>
-              <a:t>Stand alone: </a:t>
-            </a:r>
-            <a:r>
-              <a:rPr lang="en-US" dirty="0">
-                <a:hlinkClick r:id="rId13"/>
-              </a:rPr>
-              <a:t>http://ggobi.org/index.html</a:t>
-            </a:r>
-            <a:endParaRPr lang="en-US" dirty="0"/>
-          </a:p>
-          <a:p>
-            <a:r>
-              <a:rPr lang="en-US" dirty="0"/>
-              <a:t>ORCA (T. Lumley) </a:t>
-            </a:r>
-          </a:p>
-          <a:p>
-            <a:r>
-              <a:rPr lang="en-US" dirty="0"/>
-              <a:t>Stand alone: </a:t>
-            </a:r>
-            <a:r>
-              <a:rPr lang="en-US" dirty="0">
-                <a:hlinkClick r:id="rId14"/>
-              </a:rPr>
-              <a:t>http://www.theusrus.de/Mondrian/</a:t>
-            </a:r>
-            <a:r>
-              <a:rPr lang="en-US" dirty="0"/>
-              <a:t> </a:t>
-            </a:r>
-          </a:p>
-          <a:p>
-            <a:r>
-              <a:rPr lang="en-US" dirty="0"/>
-              <a:t>Liminal: https://github.com/sa-lee/liminal/</a:t>
-            </a:r>
-          </a:p>
-        </p:txBody>
-      </p:sp>
-    </p:spTree>
-    <p:extLst>
-      <p:ext uri="{BB962C8B-B14F-4D97-AF65-F5344CB8AC3E}">
-        <p14:creationId xmlns:p14="http://schemas.microsoft.com/office/powerpoint/2010/main" val="1573782056"/>
       </p:ext>
     </p:extLst>
   </p:cSld>

</xml_diff>

<commit_message>
PoC hosted, clean up images.
</commit_message>
<xml_diff>
--- a/zDesignDrafts/Sketch for stepwise tour.pptx
+++ b/zDesignDrafts/Sketch for stepwise tour.pptx
@@ -270,7 +270,7 @@
           <a:p>
             <a:fld id="{DF9E133C-D775-44AC-B629-43372F2DE94E}" type="datetimeFigureOut">
               <a:rPr lang="en-US" smtClean="0"/>
-              <a:t>16-Feb-21</a:t>
+              <a:t>17-Feb-21</a:t>
             </a:fld>
             <a:endParaRPr lang="en-US"/>
           </a:p>
@@ -468,7 +468,7 @@
           <a:p>
             <a:fld id="{DF9E133C-D775-44AC-B629-43372F2DE94E}" type="datetimeFigureOut">
               <a:rPr lang="en-US" smtClean="0"/>
-              <a:t>16-Feb-21</a:t>
+              <a:t>17-Feb-21</a:t>
             </a:fld>
             <a:endParaRPr lang="en-US"/>
           </a:p>
@@ -676,7 +676,7 @@
           <a:p>
             <a:fld id="{DF9E133C-D775-44AC-B629-43372F2DE94E}" type="datetimeFigureOut">
               <a:rPr lang="en-US" smtClean="0"/>
-              <a:t>16-Feb-21</a:t>
+              <a:t>17-Feb-21</a:t>
             </a:fld>
             <a:endParaRPr lang="en-US"/>
           </a:p>
@@ -874,7 +874,7 @@
           <a:p>
             <a:fld id="{DF9E133C-D775-44AC-B629-43372F2DE94E}" type="datetimeFigureOut">
               <a:rPr lang="en-US" smtClean="0"/>
-              <a:t>16-Feb-21</a:t>
+              <a:t>17-Feb-21</a:t>
             </a:fld>
             <a:endParaRPr lang="en-US"/>
           </a:p>
@@ -1149,7 +1149,7 @@
           <a:p>
             <a:fld id="{DF9E133C-D775-44AC-B629-43372F2DE94E}" type="datetimeFigureOut">
               <a:rPr lang="en-US" smtClean="0"/>
-              <a:t>16-Feb-21</a:t>
+              <a:t>17-Feb-21</a:t>
             </a:fld>
             <a:endParaRPr lang="en-US"/>
           </a:p>
@@ -1414,7 +1414,7 @@
           <a:p>
             <a:fld id="{DF9E133C-D775-44AC-B629-43372F2DE94E}" type="datetimeFigureOut">
               <a:rPr lang="en-US" smtClean="0"/>
-              <a:t>16-Feb-21</a:t>
+              <a:t>17-Feb-21</a:t>
             </a:fld>
             <a:endParaRPr lang="en-US"/>
           </a:p>
@@ -1826,7 +1826,7 @@
           <a:p>
             <a:fld id="{DF9E133C-D775-44AC-B629-43372F2DE94E}" type="datetimeFigureOut">
               <a:rPr lang="en-US" smtClean="0"/>
-              <a:t>16-Feb-21</a:t>
+              <a:t>17-Feb-21</a:t>
             </a:fld>
             <a:endParaRPr lang="en-US"/>
           </a:p>
@@ -1967,7 +1967,7 @@
           <a:p>
             <a:fld id="{DF9E133C-D775-44AC-B629-43372F2DE94E}" type="datetimeFigureOut">
               <a:rPr lang="en-US" smtClean="0"/>
-              <a:t>16-Feb-21</a:t>
+              <a:t>17-Feb-21</a:t>
             </a:fld>
             <a:endParaRPr lang="en-US"/>
           </a:p>
@@ -2080,7 +2080,7 @@
           <a:p>
             <a:fld id="{DF9E133C-D775-44AC-B629-43372F2DE94E}" type="datetimeFigureOut">
               <a:rPr lang="en-US" smtClean="0"/>
-              <a:t>16-Feb-21</a:t>
+              <a:t>17-Feb-21</a:t>
             </a:fld>
             <a:endParaRPr lang="en-US"/>
           </a:p>
@@ -2391,7 +2391,7 @@
           <a:p>
             <a:fld id="{DF9E133C-D775-44AC-B629-43372F2DE94E}" type="datetimeFigureOut">
               <a:rPr lang="en-US" smtClean="0"/>
-              <a:t>16-Feb-21</a:t>
+              <a:t>17-Feb-21</a:t>
             </a:fld>
             <a:endParaRPr lang="en-US"/>
           </a:p>
@@ -2679,7 +2679,7 @@
           <a:p>
             <a:fld id="{DF9E133C-D775-44AC-B629-43372F2DE94E}" type="datetimeFigureOut">
               <a:rPr lang="en-US" smtClean="0"/>
-              <a:t>16-Feb-21</a:t>
+              <a:t>17-Feb-21</a:t>
             </a:fld>
             <a:endParaRPr lang="en-US"/>
           </a:p>
@@ -2920,7 +2920,7 @@
           <a:p>
             <a:fld id="{DF9E133C-D775-44AC-B629-43372F2DE94E}" type="datetimeFigureOut">
               <a:rPr lang="en-US" smtClean="0"/>
-              <a:t>16-Feb-21</a:t>
+              <a:t>17-Feb-21</a:t>
             </a:fld>
             <a:endParaRPr lang="en-US"/>
           </a:p>
@@ -5296,8 +5296,8 @@
         </p:nvSpPr>
         <p:spPr>
           <a:xfrm>
-            <a:off x="7625919" y="239694"/>
-            <a:ext cx="4265691" cy="6494085"/>
+            <a:off x="7234023" y="239694"/>
+            <a:ext cx="4354586" cy="5478423"/>
           </a:xfrm>
           <a:prstGeom prst="rect">
             <a:avLst/>
@@ -5316,7 +5316,7 @@
           <a:lstStyle/>
           <a:p>
             <a:r>
-              <a:rPr lang="en-US" sz="1600" dirty="0">
+              <a:rPr lang="en-US" sz="1400" dirty="0">
                 <a:solidFill>
                   <a:schemeClr val="accent1">
                     <a:lumMod val="75000"/>
@@ -5331,7 +5331,7 @@
               <a:buAutoNum type="arabicParenR"/>
             </a:pPr>
             <a:r>
-              <a:rPr lang="en-US" sz="1600" dirty="0">
+              <a:rPr lang="en-US" sz="1400" dirty="0">
                 <a:solidFill>
                   <a:schemeClr val="accent1">
                     <a:lumMod val="75000"/>
@@ -5347,7 +5347,7 @@
               <a:buChar char="•"/>
             </a:pPr>
             <a:r>
-              <a:rPr lang="en-US" sz="1600" dirty="0">
+              <a:rPr lang="en-US" sz="1400" dirty="0">
                 <a:solidFill>
                   <a:schemeClr val="accent1">
                     <a:lumMod val="75000"/>
@@ -5363,7 +5363,7 @@
               <a:buChar char="•"/>
             </a:pPr>
             <a:r>
-              <a:rPr lang="en-US" sz="1600" dirty="0">
+              <a:rPr lang="en-US" sz="1400" dirty="0">
                 <a:solidFill>
                   <a:schemeClr val="accent1">
                     <a:lumMod val="75000"/>
@@ -5379,7 +5379,7 @@
               <a:buAutoNum type="arabicParenR"/>
             </a:pPr>
             <a:r>
-              <a:rPr lang="en-US" sz="1600" dirty="0">
+              <a:rPr lang="en-US" sz="1400" dirty="0">
                 <a:solidFill>
                   <a:schemeClr val="accent1">
                     <a:lumMod val="75000"/>
@@ -5395,14 +5395,14 @@
               <a:buChar char="•"/>
             </a:pPr>
             <a:r>
-              <a:rPr lang="en-US" sz="1600" dirty="0">
+              <a:rPr lang="en-US" sz="1400" dirty="0">
                 <a:solidFill>
                   <a:schemeClr val="accent1">
                     <a:lumMod val="75000"/>
                   </a:schemeClr>
                 </a:solidFill>
               </a:rPr>
-              <a:t>Estimate the Intrinsic Data Dimensionality</a:t>
+              <a:t>Estimate the Intrinsic Data Dimensionality (IDD)</a:t>
             </a:r>
           </a:p>
           <a:p>
@@ -5411,7 +5411,7 @@
               <a:buChar char="•"/>
             </a:pPr>
             <a:r>
-              <a:rPr lang="en-US" sz="1600" dirty="0">
+              <a:rPr lang="en-US" sz="1400" dirty="0">
                 <a:solidFill>
                   <a:schemeClr val="accent1">
                     <a:lumMod val="75000"/>
@@ -5427,7 +5427,7 @@
               <a:buChar char="•"/>
             </a:pPr>
             <a:r>
-              <a:rPr lang="en-US" sz="1600" dirty="0">
+              <a:rPr lang="en-US" sz="1400" dirty="0">
                 <a:solidFill>
                   <a:schemeClr val="accent1">
                     <a:lumMod val="75000"/>
@@ -5439,7 +5439,7 @@
           </a:p>
           <a:p>
             <a:r>
-              <a:rPr lang="en-US" sz="1600" dirty="0">
+              <a:rPr lang="en-US" sz="1400" dirty="0">
                 <a:solidFill>
                   <a:schemeClr val="accent1">
                     <a:lumMod val="75000"/>
@@ -5455,7 +5455,7 @@
               <a:buChar char="•"/>
             </a:pPr>
             <a:r>
-              <a:rPr lang="en-US" sz="1600" dirty="0">
+              <a:rPr lang="en-US" sz="1400" dirty="0">
                 <a:solidFill>
                   <a:schemeClr val="accent1">
                     <a:lumMod val="75000"/>
@@ -5471,7 +5471,7 @@
               <a:buChar char="•"/>
             </a:pPr>
             <a:r>
-              <a:rPr lang="en-US" sz="1600" dirty="0">
+              <a:rPr lang="en-US" sz="1400" dirty="0">
                 <a:solidFill>
                   <a:schemeClr val="accent1">
                     <a:lumMod val="75000"/>
@@ -5487,7 +5487,7 @@
               <a:buChar char="•"/>
             </a:pPr>
             <a:r>
-              <a:rPr lang="en-US" sz="1600" dirty="0">
+              <a:rPr lang="en-US" sz="1400" dirty="0">
                 <a:solidFill>
                   <a:schemeClr val="accent1">
                     <a:lumMod val="75000"/>
@@ -5499,7 +5499,7 @@
           </a:p>
           <a:p>
             <a:r>
-              <a:rPr lang="en-US" sz="1600" dirty="0">
+              <a:rPr lang="en-US" sz="1400" dirty="0">
                 <a:solidFill>
                   <a:schemeClr val="accent1">
                     <a:lumMod val="75000"/>
@@ -5515,7 +5515,7 @@
               <a:buChar char="•"/>
             </a:pPr>
             <a:r>
-              <a:rPr lang="en-US" sz="1600" dirty="0">
+              <a:rPr lang="en-US" sz="1400" dirty="0">
                 <a:solidFill>
                   <a:schemeClr val="accent1">
                     <a:lumMod val="75000"/>
@@ -5531,7 +5531,7 @@
               <a:buChar char="•"/>
             </a:pPr>
             <a:r>
-              <a:rPr lang="en-US" sz="1600" dirty="0">
+              <a:rPr lang="en-US" sz="1400" dirty="0">
                 <a:solidFill>
                   <a:schemeClr val="accent1">
                     <a:lumMod val="75000"/>
@@ -5547,37 +5547,17 @@
               <a:buChar char="•"/>
             </a:pPr>
             <a:r>
-              <a:rPr lang="en-US" sz="1600" dirty="0">
+              <a:rPr lang="en-US" sz="1400" dirty="0">
                 <a:solidFill>
                   <a:schemeClr val="accent1">
                     <a:lumMod val="75000"/>
                   </a:schemeClr>
                 </a:solidFill>
               </a:rPr>
-              <a:t>(</a:t>
-            </a:r>
-            <a:r>
-              <a:rPr lang="en-US" sz="1600" dirty="0" err="1">
-                <a:solidFill>
-                  <a:schemeClr val="accent1">
-                    <a:lumMod val="75000"/>
-                  </a:schemeClr>
-                </a:solidFill>
-              </a:rPr>
-              <a:t>i</a:t>
-            </a:r>
-            <a:r>
-              <a:rPr lang="en-US" sz="1600" dirty="0">
-                <a:solidFill>
-                  <a:schemeClr val="accent1">
-                    <a:lumMod val="75000"/>
-                  </a:schemeClr>
-                </a:solidFill>
-              </a:rPr>
-              <a:t>) info icon everywhere giving explanation &amp; defaults.</a:t>
+              <a:t>Info icon everywhere giving explanation &amp; defaults and selected values.</a:t>
             </a:r>
             <a:br>
-              <a:rPr lang="en-US" sz="1600" dirty="0">
+              <a:rPr lang="en-US" sz="1400" dirty="0">
                 <a:solidFill>
                   <a:schemeClr val="accent1">
                     <a:lumMod val="75000"/>
@@ -5585,7 +5565,7 @@
                 </a:solidFill>
               </a:rPr>
             </a:br>
-            <a:endParaRPr lang="en-US" sz="1600" dirty="0">
+            <a:endParaRPr lang="en-US" sz="1400" dirty="0">
               <a:solidFill>
                 <a:schemeClr val="accent1">
                   <a:lumMod val="75000"/>
@@ -5595,7 +5575,7 @@
           </a:p>
           <a:p>
             <a:r>
-              <a:rPr lang="en-US" sz="1600" dirty="0">
+              <a:rPr lang="en-US" sz="1400" dirty="0">
                 <a:solidFill>
                   <a:schemeClr val="accent1">
                     <a:lumMod val="75000"/>
@@ -5606,13 +5586,16 @@
             </a:r>
           </a:p>
           <a:p>
-            <a:endParaRPr lang="en-US" sz="1600" dirty="0">
-              <a:solidFill>
-                <a:schemeClr val="accent1">
-                  <a:lumMod val="75000"/>
-                </a:schemeClr>
-              </a:solidFill>
-            </a:endParaRPr>
+            <a:r>
+              <a:rPr lang="en-US" sz="1400" dirty="0">
+                <a:solidFill>
+                  <a:schemeClr val="accent1">
+                    <a:lumMod val="75000"/>
+                  </a:schemeClr>
+                </a:solidFill>
+              </a:rPr>
+              <a:t>https://ebsmonash.shinyapps.io/ML_EDA__PoC/</a:t>
+            </a:r>
           </a:p>
         </p:txBody>
       </p:sp>
@@ -5633,7 +5616,7 @@
         <p:spPr>
           <a:xfrm flipH="1">
             <a:off x="4971495" y="412819"/>
-            <a:ext cx="2538242" cy="0"/>
+            <a:ext cx="2129101" cy="0"/>
           </a:xfrm>
           <a:prstGeom prst="straightConnector1">
             <a:avLst/>
@@ -5764,7 +5747,7 @@
         </p:nvSpPr>
         <p:spPr>
           <a:xfrm>
-            <a:off x="290078" y="6137404"/>
+            <a:off x="1012661" y="6142419"/>
             <a:ext cx="7335841" cy="715581"/>
           </a:xfrm>
           <a:prstGeom prst="rect">
@@ -5890,21 +5873,7 @@
                 <a:latin typeface="Arial" panose="020B0604020202020204" pitchFamily="34" charset="0"/>
                 <a:cs typeface="Arial" panose="020B0604020202020204" pitchFamily="34" charset="0"/>
               </a:rPr>
-              <a:t>(blue) proposed, N. Spyrison &amp; C. </a:t>
-            </a:r>
-            <a:r>
-              <a:rPr lang="en-US" sz="1350" dirty="0" err="1">
-                <a:latin typeface="Arial" panose="020B0604020202020204" pitchFamily="34" charset="0"/>
-                <a:cs typeface="Arial" panose="020B0604020202020204" pitchFamily="34" charset="0"/>
-              </a:rPr>
-              <a:t>Doogan</a:t>
-            </a:r>
-            <a:r>
-              <a:rPr lang="en-US" sz="1350" dirty="0">
-                <a:latin typeface="Arial" panose="020B0604020202020204" pitchFamily="34" charset="0"/>
-                <a:cs typeface="Arial" panose="020B0604020202020204" pitchFamily="34" charset="0"/>
-              </a:rPr>
-              <a:t>  </a:t>
+              <a:t>(blue) proposed, N. Spyrison &amp; C. Doogan  </a:t>
             </a:r>
           </a:p>
         </p:txBody>

</xml_diff>

<commit_message>
bullet allignment on slide/.png
</commit_message>
<xml_diff>
--- a/zDesignDrafts/Sketch for stepwise tour.pptx
+++ b/zDesignDrafts/Sketch for stepwise tour.pptx
@@ -270,7 +270,7 @@
           <a:p>
             <a:fld id="{DF9E133C-D775-44AC-B629-43372F2DE94E}" type="datetimeFigureOut">
               <a:rPr lang="en-US" smtClean="0"/>
-              <a:t>17-Feb-21</a:t>
+              <a:t>18-Feb-21</a:t>
             </a:fld>
             <a:endParaRPr lang="en-US"/>
           </a:p>
@@ -468,7 +468,7 @@
           <a:p>
             <a:fld id="{DF9E133C-D775-44AC-B629-43372F2DE94E}" type="datetimeFigureOut">
               <a:rPr lang="en-US" smtClean="0"/>
-              <a:t>17-Feb-21</a:t>
+              <a:t>18-Feb-21</a:t>
             </a:fld>
             <a:endParaRPr lang="en-US"/>
           </a:p>
@@ -676,7 +676,7 @@
           <a:p>
             <a:fld id="{DF9E133C-D775-44AC-B629-43372F2DE94E}" type="datetimeFigureOut">
               <a:rPr lang="en-US" smtClean="0"/>
-              <a:t>17-Feb-21</a:t>
+              <a:t>18-Feb-21</a:t>
             </a:fld>
             <a:endParaRPr lang="en-US"/>
           </a:p>
@@ -874,7 +874,7 @@
           <a:p>
             <a:fld id="{DF9E133C-D775-44AC-B629-43372F2DE94E}" type="datetimeFigureOut">
               <a:rPr lang="en-US" smtClean="0"/>
-              <a:t>17-Feb-21</a:t>
+              <a:t>18-Feb-21</a:t>
             </a:fld>
             <a:endParaRPr lang="en-US"/>
           </a:p>
@@ -1149,7 +1149,7 @@
           <a:p>
             <a:fld id="{DF9E133C-D775-44AC-B629-43372F2DE94E}" type="datetimeFigureOut">
               <a:rPr lang="en-US" smtClean="0"/>
-              <a:t>17-Feb-21</a:t>
+              <a:t>18-Feb-21</a:t>
             </a:fld>
             <a:endParaRPr lang="en-US"/>
           </a:p>
@@ -1414,7 +1414,7 @@
           <a:p>
             <a:fld id="{DF9E133C-D775-44AC-B629-43372F2DE94E}" type="datetimeFigureOut">
               <a:rPr lang="en-US" smtClean="0"/>
-              <a:t>17-Feb-21</a:t>
+              <a:t>18-Feb-21</a:t>
             </a:fld>
             <a:endParaRPr lang="en-US"/>
           </a:p>
@@ -1826,7 +1826,7 @@
           <a:p>
             <a:fld id="{DF9E133C-D775-44AC-B629-43372F2DE94E}" type="datetimeFigureOut">
               <a:rPr lang="en-US" smtClean="0"/>
-              <a:t>17-Feb-21</a:t>
+              <a:t>18-Feb-21</a:t>
             </a:fld>
             <a:endParaRPr lang="en-US"/>
           </a:p>
@@ -1967,7 +1967,7 @@
           <a:p>
             <a:fld id="{DF9E133C-D775-44AC-B629-43372F2DE94E}" type="datetimeFigureOut">
               <a:rPr lang="en-US" smtClean="0"/>
-              <a:t>17-Feb-21</a:t>
+              <a:t>18-Feb-21</a:t>
             </a:fld>
             <a:endParaRPr lang="en-US"/>
           </a:p>
@@ -2080,7 +2080,7 @@
           <a:p>
             <a:fld id="{DF9E133C-D775-44AC-B629-43372F2DE94E}" type="datetimeFigureOut">
               <a:rPr lang="en-US" smtClean="0"/>
-              <a:t>17-Feb-21</a:t>
+              <a:t>18-Feb-21</a:t>
             </a:fld>
             <a:endParaRPr lang="en-US"/>
           </a:p>
@@ -2391,7 +2391,7 @@
           <a:p>
             <a:fld id="{DF9E133C-D775-44AC-B629-43372F2DE94E}" type="datetimeFigureOut">
               <a:rPr lang="en-US" smtClean="0"/>
-              <a:t>17-Feb-21</a:t>
+              <a:t>18-Feb-21</a:t>
             </a:fld>
             <a:endParaRPr lang="en-US"/>
           </a:p>
@@ -2679,7 +2679,7 @@
           <a:p>
             <a:fld id="{DF9E133C-D775-44AC-B629-43372F2DE94E}" type="datetimeFigureOut">
               <a:rPr lang="en-US" smtClean="0"/>
-              <a:t>17-Feb-21</a:t>
+              <a:t>18-Feb-21</a:t>
             </a:fld>
             <a:endParaRPr lang="en-US"/>
           </a:p>
@@ -2920,7 +2920,7 @@
           <a:p>
             <a:fld id="{DF9E133C-D775-44AC-B629-43372F2DE94E}" type="datetimeFigureOut">
               <a:rPr lang="en-US" smtClean="0"/>
-              <a:t>17-Feb-21</a:t>
+              <a:t>18-Feb-21</a:t>
             </a:fld>
             <a:endParaRPr lang="en-US"/>
           </a:p>
@@ -5450,7 +5450,7 @@
             </a:r>
           </a:p>
           <a:p>
-            <a:pPr marL="285750" indent="-285750">
+            <a:pPr marL="742950" lvl="1" indent="-285750">
               <a:buFont typeface="Arial" panose="020B0604020202020204" pitchFamily="34" charset="0"/>
               <a:buChar char="•"/>
             </a:pPr>
@@ -5466,7 +5466,7 @@
             </a:r>
           </a:p>
           <a:p>
-            <a:pPr marL="285750" indent="-285750">
+            <a:pPr marL="742950" lvl="1" indent="-285750">
               <a:buFont typeface="Arial" panose="020B0604020202020204" pitchFamily="34" charset="0"/>
               <a:buChar char="•"/>
             </a:pPr>
@@ -5482,7 +5482,7 @@
             </a:r>
           </a:p>
           <a:p>
-            <a:pPr marL="285750" indent="-285750">
+            <a:pPr marL="742950" lvl="1" indent="-285750">
               <a:buFont typeface="Arial" panose="020B0604020202020204" pitchFamily="34" charset="0"/>
               <a:buChar char="•"/>
             </a:pPr>
@@ -5510,7 +5510,7 @@
             </a:r>
           </a:p>
           <a:p>
-            <a:pPr marL="285750" indent="-285750">
+            <a:pPr marL="742950" lvl="1" indent="-285750">
               <a:buFont typeface="Arial" panose="020B0604020202020204" pitchFamily="34" charset="0"/>
               <a:buChar char="•"/>
             </a:pPr>
@@ -5526,7 +5526,7 @@
             </a:r>
           </a:p>
           <a:p>
-            <a:pPr marL="285750" indent="-285750">
+            <a:pPr marL="742950" lvl="1" indent="-285750">
               <a:buFont typeface="Arial" panose="020B0604020202020204" pitchFamily="34" charset="0"/>
               <a:buChar char="•"/>
             </a:pPr>
@@ -5542,7 +5542,7 @@
             </a:r>
           </a:p>
           <a:p>
-            <a:pPr marL="285750" indent="-285750">
+            <a:pPr marL="742950" lvl="1" indent="-285750">
               <a:buFont typeface="Arial" panose="020B0604020202020204" pitchFamily="34" charset="0"/>
               <a:buChar char="•"/>
             </a:pPr>

</xml_diff>